<commit_message>
worked on figure captions
</commit_message>
<xml_diff>
--- a/restingstate_figures.pptx
+++ b/restingstate_figures.pptx
@@ -6,6 +6,8 @@
   </p:sldMasterIdLst>
   <p:sldIdLst>
     <p:sldId id="256" r:id="rId2"/>
+    <p:sldId id="257" r:id="rId3"/>
+    <p:sldId id="258" r:id="rId4"/>
   </p:sldIdLst>
   <p:sldSz cx="12192000" cy="6858000"/>
   <p:notesSz cx="6858000" cy="9144000"/>
@@ -3321,53 +3323,74 @@
           <a:chExt cx="0" cy="0"/>
         </a:xfrm>
       </p:grpSpPr>
-      <p:sp>
-        <p:nvSpPr>
-          <p:cNvPr id="2" name="Title 1">
-            <a:extLst>
-              <a:ext uri="{FF2B5EF4-FFF2-40B4-BE49-F238E27FC236}">
-                <a16:creationId xmlns:a16="http://schemas.microsoft.com/office/drawing/2014/main" id="{40F8485F-F0DD-0B60-46E4-9EE33C43FF06}"/>
-              </a:ext>
-            </a:extLst>
-          </p:cNvPr>
-          <p:cNvSpPr>
-            <a:spLocks noGrp="1"/>
-          </p:cNvSpPr>
-          <p:nvPr>
-            <p:ph type="ctrTitle"/>
-          </p:nvPr>
-        </p:nvSpPr>
-        <p:spPr/>
-        <p:txBody>
-          <a:bodyPr/>
-          <a:lstStyle/>
-          <a:p>
-            <a:endParaRPr lang="en-US"/>
-          </a:p>
-        </p:txBody>
-      </p:sp>
-      <p:sp>
-        <p:nvSpPr>
-          <p:cNvPr id="3" name="Subtitle 2">
-            <a:extLst>
-              <a:ext uri="{FF2B5EF4-FFF2-40B4-BE49-F238E27FC236}">
-                <a16:creationId xmlns:a16="http://schemas.microsoft.com/office/drawing/2014/main" id="{6D948588-D462-DFA9-74C3-5EC75309C9AD}"/>
-              </a:ext>
-            </a:extLst>
-          </p:cNvPr>
-          <p:cNvSpPr>
-            <a:spLocks noGrp="1"/>
-          </p:cNvSpPr>
-          <p:nvPr>
-            <p:ph type="subTitle" idx="1"/>
-          </p:nvPr>
-        </p:nvSpPr>
-        <p:spPr/>
-        <p:txBody>
-          <a:bodyPr/>
-          <a:lstStyle/>
-          <a:p>
-            <a:endParaRPr lang="en-US"/>
+      <p:pic>
+        <p:nvPicPr>
+          <p:cNvPr id="7" name="Picture 6" descr="A picture containing brain, art, reef&#10;&#10;Description automatically generated">
+            <a:extLst>
+              <a:ext uri="{FF2B5EF4-FFF2-40B4-BE49-F238E27FC236}">
+                <a16:creationId xmlns:a16="http://schemas.microsoft.com/office/drawing/2014/main" id="{D1B12DB6-7929-075F-588F-B4B3176E4C2E}"/>
+              </a:ext>
+            </a:extLst>
+          </p:cNvPr>
+          <p:cNvPicPr>
+            <a:picLocks noChangeAspect="1"/>
+          </p:cNvPicPr>
+          <p:nvPr/>
+        </p:nvPicPr>
+        <p:blipFill>
+          <a:blip r:embed="rId2">
+            <a:extLst>
+              <a:ext uri="{28A0092B-C50C-407E-A947-70E740481C1C}">
+                <a14:useLocalDpi xmlns:a14="http://schemas.microsoft.com/office/drawing/2010/main" val="0"/>
+              </a:ext>
+            </a:extLst>
+          </a:blip>
+          <a:stretch>
+            <a:fillRect/>
+          </a:stretch>
+        </p:blipFill>
+        <p:spPr>
+          <a:xfrm>
+            <a:off x="3621889" y="648692"/>
+            <a:ext cx="4948221" cy="4948221"/>
+          </a:xfrm>
+          <a:prstGeom prst="rect">
+            <a:avLst/>
+          </a:prstGeom>
+        </p:spPr>
+      </p:pic>
+      <p:sp>
+        <p:nvSpPr>
+          <p:cNvPr id="8" name="TextBox 7">
+            <a:extLst>
+              <a:ext uri="{FF2B5EF4-FFF2-40B4-BE49-F238E27FC236}">
+                <a16:creationId xmlns:a16="http://schemas.microsoft.com/office/drawing/2014/main" id="{D14E65D0-7C8A-042E-2091-0CC2619A0328}"/>
+              </a:ext>
+            </a:extLst>
+          </p:cNvPr>
+          <p:cNvSpPr txBox="1"/>
+          <p:nvPr/>
+        </p:nvSpPr>
+        <p:spPr>
+          <a:xfrm>
+            <a:off x="3221373" y="464026"/>
+            <a:ext cx="5558509" cy="369332"/>
+          </a:xfrm>
+          <a:prstGeom prst="rect">
+            <a:avLst/>
+          </a:prstGeom>
+          <a:noFill/>
+        </p:spPr>
+        <p:txBody>
+          <a:bodyPr wrap="none" rtlCol="0">
+            <a:spAutoFit/>
+          </a:bodyPr>
+          <a:lstStyle/>
+          <a:p>
+            <a:r>
+              <a:rPr lang="en-US" dirty="0"/>
+              <a:t>Red: Significant changes in network activation pre to post</a:t>
+            </a:r>
           </a:p>
         </p:txBody>
       </p:sp>
@@ -3375,6 +3398,212 @@
     <p:extLst>
       <p:ext uri="{BB962C8B-B14F-4D97-AF65-F5344CB8AC3E}">
         <p14:creationId xmlns:p14="http://schemas.microsoft.com/office/powerpoint/2010/main" val="4143191922"/>
+      </p:ext>
+    </p:extLst>
+  </p:cSld>
+  <p:clrMapOvr>
+    <a:masterClrMapping/>
+  </p:clrMapOvr>
+</p:sld>
+</file>
+
+<file path=ppt/slides/slide2.xml><?xml version="1.0" encoding="utf-8"?>
+<p:sld xmlns:a="http://schemas.openxmlformats.org/drawingml/2006/main" xmlns:r="http://schemas.openxmlformats.org/officeDocument/2006/relationships" xmlns:p="http://schemas.openxmlformats.org/presentationml/2006/main">
+  <p:cSld>
+    <p:spTree>
+      <p:nvGrpSpPr>
+        <p:cNvPr id="1" name=""/>
+        <p:cNvGrpSpPr/>
+        <p:nvPr/>
+      </p:nvGrpSpPr>
+      <p:grpSpPr>
+        <a:xfrm>
+          <a:off x="0" y="0"/>
+          <a:ext cx="0" cy="0"/>
+          <a:chOff x="0" y="0"/>
+          <a:chExt cx="0" cy="0"/>
+        </a:xfrm>
+      </p:grpSpPr>
+      <p:pic>
+        <p:nvPicPr>
+          <p:cNvPr id="3" name="Picture 2" descr="A picture containing map&#10;&#10;Description automatically generated">
+            <a:extLst>
+              <a:ext uri="{FF2B5EF4-FFF2-40B4-BE49-F238E27FC236}">
+                <a16:creationId xmlns:a16="http://schemas.microsoft.com/office/drawing/2014/main" id="{645DD9C4-D658-5EC1-F876-B0D63E88E662}"/>
+              </a:ext>
+            </a:extLst>
+          </p:cNvPr>
+          <p:cNvPicPr>
+            <a:picLocks noChangeAspect="1"/>
+          </p:cNvPicPr>
+          <p:nvPr/>
+        </p:nvPicPr>
+        <p:blipFill>
+          <a:blip r:embed="rId2">
+            <a:extLst>
+              <a:ext uri="{28A0092B-C50C-407E-A947-70E740481C1C}">
+                <a14:useLocalDpi xmlns:a14="http://schemas.microsoft.com/office/drawing/2010/main" val="0"/>
+              </a:ext>
+            </a:extLst>
+          </a:blip>
+          <a:stretch>
+            <a:fillRect/>
+          </a:stretch>
+        </p:blipFill>
+        <p:spPr>
+          <a:xfrm>
+            <a:off x="3572486" y="823483"/>
+            <a:ext cx="5047027" cy="5047027"/>
+          </a:xfrm>
+          <a:prstGeom prst="rect">
+            <a:avLst/>
+          </a:prstGeom>
+        </p:spPr>
+      </p:pic>
+      <p:sp>
+        <p:nvSpPr>
+          <p:cNvPr id="4" name="TextBox 3">
+            <a:extLst>
+              <a:ext uri="{FF2B5EF4-FFF2-40B4-BE49-F238E27FC236}">
+                <a16:creationId xmlns:a16="http://schemas.microsoft.com/office/drawing/2014/main" id="{539CE700-7F58-B559-4A72-54C9CD693C1B}"/>
+              </a:ext>
+            </a:extLst>
+          </p:cNvPr>
+          <p:cNvSpPr txBox="1"/>
+          <p:nvPr/>
+        </p:nvSpPr>
+        <p:spPr>
+          <a:xfrm>
+            <a:off x="4840448" y="823483"/>
+            <a:ext cx="4098814" cy="369332"/>
+          </a:xfrm>
+          <a:prstGeom prst="rect">
+            <a:avLst/>
+          </a:prstGeom>
+          <a:noFill/>
+        </p:spPr>
+        <p:txBody>
+          <a:bodyPr wrap="none" rtlCol="0">
+            <a:spAutoFit/>
+          </a:bodyPr>
+          <a:lstStyle/>
+          <a:p>
+            <a:r>
+              <a:rPr lang="en-US" dirty="0"/>
+              <a:t>Blue: network activation at pre-treatment</a:t>
+            </a:r>
+          </a:p>
+        </p:txBody>
+      </p:sp>
+    </p:spTree>
+    <p:extLst>
+      <p:ext uri="{BB962C8B-B14F-4D97-AF65-F5344CB8AC3E}">
+        <p14:creationId xmlns:p14="http://schemas.microsoft.com/office/powerpoint/2010/main" val="2074366714"/>
+      </p:ext>
+    </p:extLst>
+  </p:cSld>
+  <p:clrMapOvr>
+    <a:masterClrMapping/>
+  </p:clrMapOvr>
+</p:sld>
+</file>
+
+<file path=ppt/slides/slide3.xml><?xml version="1.0" encoding="utf-8"?>
+<p:sld xmlns:a="http://schemas.openxmlformats.org/drawingml/2006/main" xmlns:r="http://schemas.openxmlformats.org/officeDocument/2006/relationships" xmlns:p="http://schemas.openxmlformats.org/presentationml/2006/main">
+  <p:cSld>
+    <p:spTree>
+      <p:nvGrpSpPr>
+        <p:cNvPr id="1" name=""/>
+        <p:cNvGrpSpPr/>
+        <p:nvPr/>
+      </p:nvGrpSpPr>
+      <p:grpSpPr>
+        <a:xfrm>
+          <a:off x="0" y="0"/>
+          <a:ext cx="0" cy="0"/>
+          <a:chOff x="0" y="0"/>
+          <a:chExt cx="0" cy="0"/>
+        </a:xfrm>
+      </p:grpSpPr>
+      <p:pic>
+        <p:nvPicPr>
+          <p:cNvPr id="5" name="Picture 4" descr="A red line with black dots&#10;&#10;Description automatically generated with low confidence">
+            <a:extLst>
+              <a:ext uri="{FF2B5EF4-FFF2-40B4-BE49-F238E27FC236}">
+                <a16:creationId xmlns:a16="http://schemas.microsoft.com/office/drawing/2014/main" id="{5497A580-F099-73A9-0BE7-6DF46C03D487}"/>
+              </a:ext>
+            </a:extLst>
+          </p:cNvPr>
+          <p:cNvPicPr>
+            <a:picLocks noChangeAspect="1"/>
+          </p:cNvPicPr>
+          <p:nvPr/>
+        </p:nvPicPr>
+        <p:blipFill>
+          <a:blip r:embed="rId2">
+            <a:extLst>
+              <a:ext uri="{28A0092B-C50C-407E-A947-70E740481C1C}">
+                <a14:useLocalDpi xmlns:a14="http://schemas.microsoft.com/office/drawing/2010/main" val="0"/>
+              </a:ext>
+            </a:extLst>
+          </a:blip>
+          <a:stretch>
+            <a:fillRect/>
+          </a:stretch>
+        </p:blipFill>
+        <p:spPr>
+          <a:xfrm>
+            <a:off x="2460557" y="1005371"/>
+            <a:ext cx="7270886" cy="4847257"/>
+          </a:xfrm>
+          <a:prstGeom prst="rect">
+            <a:avLst/>
+          </a:prstGeom>
+        </p:spPr>
+      </p:pic>
+      <p:sp>
+        <p:nvSpPr>
+          <p:cNvPr id="6" name="TextBox 5">
+            <a:extLst>
+              <a:ext uri="{FF2B5EF4-FFF2-40B4-BE49-F238E27FC236}">
+                <a16:creationId xmlns:a16="http://schemas.microsoft.com/office/drawing/2014/main" id="{D30B8FFD-2B17-E19B-120E-B749BAC03A39}"/>
+              </a:ext>
+            </a:extLst>
+          </p:cNvPr>
+          <p:cNvSpPr txBox="1"/>
+          <p:nvPr/>
+        </p:nvSpPr>
+        <p:spPr>
+          <a:xfrm>
+            <a:off x="4607767" y="543059"/>
+            <a:ext cx="2976465" cy="523220"/>
+          </a:xfrm>
+          <a:prstGeom prst="rect">
+            <a:avLst/>
+          </a:prstGeom>
+          <a:noFill/>
+        </p:spPr>
+        <p:txBody>
+          <a:bodyPr wrap="square" rtlCol="0">
+            <a:spAutoFit/>
+          </a:bodyPr>
+          <a:lstStyle/>
+          <a:p>
+            <a:pPr algn="ctr"/>
+            <a:r>
+              <a:rPr lang="en-US" sz="2800" b="1" dirty="0">
+                <a:latin typeface="Arial" panose="020B0604020202020204" pitchFamily="34" charset="0"/>
+                <a:cs typeface="Arial" panose="020B0604020202020204" pitchFamily="34" charset="0"/>
+              </a:rPr>
+              <a:t>Amygdala</a:t>
+            </a:r>
+          </a:p>
+        </p:txBody>
+      </p:sp>
+    </p:spTree>
+    <p:extLst>
+      <p:ext uri="{BB962C8B-B14F-4D97-AF65-F5344CB8AC3E}">
+        <p14:creationId xmlns:p14="http://schemas.microsoft.com/office/powerpoint/2010/main" val="1925184178"/>
       </p:ext>
     </p:extLst>
   </p:cSld>

</xml_diff>

<commit_message>
finishing first draft of figures
</commit_message>
<xml_diff>
--- a/restingstate_figures.pptx
+++ b/restingstate_figures.pptx
@@ -5,9 +5,8 @@
     <p:sldMasterId id="2147483648" r:id="rId1"/>
   </p:sldMasterIdLst>
   <p:sldIdLst>
-    <p:sldId id="256" r:id="rId2"/>
-    <p:sldId id="257" r:id="rId3"/>
-    <p:sldId id="258" r:id="rId4"/>
+    <p:sldId id="257" r:id="rId2"/>
+    <p:sldId id="258" r:id="rId3"/>
   </p:sldIdLst>
   <p:sldSz cx="12192000" cy="6858000"/>
   <p:notesSz cx="6858000" cy="9144000"/>
@@ -106,6 +105,11 @@
       </a:defRPr>
     </a:lvl9pPr>
   </p:defaultTextStyle>
+  <p:extLst>
+    <p:ext uri="{EFAFB233-063F-42B5-8137-9DF3F51BA10A}">
+      <p15:sldGuideLst xmlns:p15="http://schemas.microsoft.com/office/powerpoint/2012/main"/>
+    </p:ext>
+  </p:extLst>
 </p:presentation>
 </file>
 
@@ -256,7 +260,7 @@
           <a:p>
             <a:fld id="{D361DC46-4C98-4A65-A426-E76E09BB01EE}" type="datetimeFigureOut">
               <a:rPr lang="en-US" smtClean="0"/>
-              <a:t>5/30/2023</a:t>
+              <a:t>6/2/2023</a:t>
             </a:fld>
             <a:endParaRPr lang="en-US"/>
           </a:p>
@@ -454,7 +458,7 @@
           <a:p>
             <a:fld id="{D361DC46-4C98-4A65-A426-E76E09BB01EE}" type="datetimeFigureOut">
               <a:rPr lang="en-US" smtClean="0"/>
-              <a:t>5/30/2023</a:t>
+              <a:t>6/2/2023</a:t>
             </a:fld>
             <a:endParaRPr lang="en-US"/>
           </a:p>
@@ -662,7 +666,7 @@
           <a:p>
             <a:fld id="{D361DC46-4C98-4A65-A426-E76E09BB01EE}" type="datetimeFigureOut">
               <a:rPr lang="en-US" smtClean="0"/>
-              <a:t>5/30/2023</a:t>
+              <a:t>6/2/2023</a:t>
             </a:fld>
             <a:endParaRPr lang="en-US"/>
           </a:p>
@@ -860,7 +864,7 @@
           <a:p>
             <a:fld id="{D361DC46-4C98-4A65-A426-E76E09BB01EE}" type="datetimeFigureOut">
               <a:rPr lang="en-US" smtClean="0"/>
-              <a:t>5/30/2023</a:t>
+              <a:t>6/2/2023</a:t>
             </a:fld>
             <a:endParaRPr lang="en-US"/>
           </a:p>
@@ -1135,7 +1139,7 @@
           <a:p>
             <a:fld id="{D361DC46-4C98-4A65-A426-E76E09BB01EE}" type="datetimeFigureOut">
               <a:rPr lang="en-US" smtClean="0"/>
-              <a:t>5/30/2023</a:t>
+              <a:t>6/2/2023</a:t>
             </a:fld>
             <a:endParaRPr lang="en-US"/>
           </a:p>
@@ -1400,7 +1404,7 @@
           <a:p>
             <a:fld id="{D361DC46-4C98-4A65-A426-E76E09BB01EE}" type="datetimeFigureOut">
               <a:rPr lang="en-US" smtClean="0"/>
-              <a:t>5/30/2023</a:t>
+              <a:t>6/2/2023</a:t>
             </a:fld>
             <a:endParaRPr lang="en-US"/>
           </a:p>
@@ -1812,7 +1816,7 @@
           <a:p>
             <a:fld id="{D361DC46-4C98-4A65-A426-E76E09BB01EE}" type="datetimeFigureOut">
               <a:rPr lang="en-US" smtClean="0"/>
-              <a:t>5/30/2023</a:t>
+              <a:t>6/2/2023</a:t>
             </a:fld>
             <a:endParaRPr lang="en-US"/>
           </a:p>
@@ -1953,7 +1957,7 @@
           <a:p>
             <a:fld id="{D361DC46-4C98-4A65-A426-E76E09BB01EE}" type="datetimeFigureOut">
               <a:rPr lang="en-US" smtClean="0"/>
-              <a:t>5/30/2023</a:t>
+              <a:t>6/2/2023</a:t>
             </a:fld>
             <a:endParaRPr lang="en-US"/>
           </a:p>
@@ -2066,7 +2070,7 @@
           <a:p>
             <a:fld id="{D361DC46-4C98-4A65-A426-E76E09BB01EE}" type="datetimeFigureOut">
               <a:rPr lang="en-US" smtClean="0"/>
-              <a:t>5/30/2023</a:t>
+              <a:t>6/2/2023</a:t>
             </a:fld>
             <a:endParaRPr lang="en-US"/>
           </a:p>
@@ -2377,7 +2381,7 @@
           <a:p>
             <a:fld id="{D361DC46-4C98-4A65-A426-E76E09BB01EE}" type="datetimeFigureOut">
               <a:rPr lang="en-US" smtClean="0"/>
-              <a:t>5/30/2023</a:t>
+              <a:t>6/2/2023</a:t>
             </a:fld>
             <a:endParaRPr lang="en-US"/>
           </a:p>
@@ -2665,7 +2669,7 @@
           <a:p>
             <a:fld id="{D361DC46-4C98-4A65-A426-E76E09BB01EE}" type="datetimeFigureOut">
               <a:rPr lang="en-US" smtClean="0"/>
-              <a:t>5/30/2023</a:t>
+              <a:t>6/2/2023</a:t>
             </a:fld>
             <a:endParaRPr lang="en-US"/>
           </a:p>
@@ -2906,7 +2910,7 @@
           <a:p>
             <a:fld id="{D361DC46-4C98-4A65-A426-E76E09BB01EE}" type="datetimeFigureOut">
               <a:rPr lang="en-US" smtClean="0"/>
-              <a:t>5/30/2023</a:t>
+              <a:t>6/2/2023</a:t>
             </a:fld>
             <a:endParaRPr lang="en-US"/>
           </a:p>
@@ -3325,10 +3329,10 @@
       </p:grpSpPr>
       <p:pic>
         <p:nvPicPr>
-          <p:cNvPr id="7" name="Picture 6" descr="A picture containing brain, art, reef&#10;&#10;Description automatically generated">
-            <a:extLst>
-              <a:ext uri="{FF2B5EF4-FFF2-40B4-BE49-F238E27FC236}">
-                <a16:creationId xmlns:a16="http://schemas.microsoft.com/office/drawing/2014/main" id="{D1B12DB6-7929-075F-588F-B4B3176E4C2E}"/>
+          <p:cNvPr id="3" name="Picture 2" descr="A picture containing map&#10;&#10;Description automatically generated">
+            <a:extLst>
+              <a:ext uri="{FF2B5EF4-FFF2-40B4-BE49-F238E27FC236}">
+                <a16:creationId xmlns:a16="http://schemas.microsoft.com/office/drawing/2014/main" id="{645DD9C4-D658-5EC1-F876-B0D63E88E662}"/>
               </a:ext>
             </a:extLst>
           </p:cNvPr>
@@ -3351,20 +3355,56 @@
         </p:blipFill>
         <p:spPr>
           <a:xfrm>
-            <a:off x="3621889" y="648692"/>
-            <a:ext cx="4948221" cy="4948221"/>
+            <a:off x="6809649" y="1173952"/>
+            <a:ext cx="3600695" cy="3600695"/>
           </a:xfrm>
           <a:prstGeom prst="rect">
             <a:avLst/>
           </a:prstGeom>
         </p:spPr>
       </p:pic>
-      <p:sp>
-        <p:nvSpPr>
-          <p:cNvPr id="8" name="TextBox 7">
-            <a:extLst>
-              <a:ext uri="{FF2B5EF4-FFF2-40B4-BE49-F238E27FC236}">
-                <a16:creationId xmlns:a16="http://schemas.microsoft.com/office/drawing/2014/main" id="{D14E65D0-7C8A-042E-2091-0CC2619A0328}"/>
+      <p:pic>
+        <p:nvPicPr>
+          <p:cNvPr id="2" name="Picture 1" descr="A picture containing brain, art, reef&#10;&#10;Description automatically generated">
+            <a:extLst>
+              <a:ext uri="{FF2B5EF4-FFF2-40B4-BE49-F238E27FC236}">
+                <a16:creationId xmlns:a16="http://schemas.microsoft.com/office/drawing/2014/main" id="{5506DEF2-E30E-0690-AE51-75B412F5F208}"/>
+              </a:ext>
+            </a:extLst>
+          </p:cNvPr>
+          <p:cNvPicPr>
+            <a:picLocks noChangeAspect="1"/>
+          </p:cNvPicPr>
+          <p:nvPr/>
+        </p:nvPicPr>
+        <p:blipFill>
+          <a:blip r:embed="rId3">
+            <a:extLst>
+              <a:ext uri="{28A0092B-C50C-407E-A947-70E740481C1C}">
+                <a14:useLocalDpi xmlns:a14="http://schemas.microsoft.com/office/drawing/2010/main" val="0"/>
+              </a:ext>
+            </a:extLst>
+          </a:blip>
+          <a:stretch>
+            <a:fillRect/>
+          </a:stretch>
+        </p:blipFill>
+        <p:spPr>
+          <a:xfrm>
+            <a:off x="1890565" y="1095381"/>
+            <a:ext cx="3757838" cy="3757838"/>
+          </a:xfrm>
+          <a:prstGeom prst="rect">
+            <a:avLst/>
+          </a:prstGeom>
+        </p:spPr>
+      </p:pic>
+      <p:sp>
+        <p:nvSpPr>
+          <p:cNvPr id="5" name="TextBox 4">
+            <a:extLst>
+              <a:ext uri="{FF2B5EF4-FFF2-40B4-BE49-F238E27FC236}">
+                <a16:creationId xmlns:a16="http://schemas.microsoft.com/office/drawing/2014/main" id="{2C1E8CCE-067B-B6CA-96E9-633E6EE25799}"/>
               </a:ext>
             </a:extLst>
           </p:cNvPr>
@@ -3373,8 +3413,8 @@
         </p:nvSpPr>
         <p:spPr>
           <a:xfrm>
-            <a:off x="3221373" y="464026"/>
-            <a:ext cx="5558509" cy="369332"/>
+            <a:off x="2101706" y="5298314"/>
+            <a:ext cx="8498832" cy="1200329"/>
           </a:xfrm>
           <a:prstGeom prst="rect">
             <a:avLst/>
@@ -3382,14 +3422,297 @@
           <a:noFill/>
         </p:spPr>
         <p:txBody>
+          <a:bodyPr wrap="square" rtlCol="0">
+            <a:spAutoFit/>
+          </a:bodyPr>
+          <a:lstStyle/>
+          <a:p>
+            <a:r>
+              <a:rPr lang="en-US" dirty="0"/>
+              <a:t>Caption: Maps of resting state network activation. (A) Significant increases in resting state network activation from pre-treatment to post-treatment. (B) Resting state network activation at pre-treatment (blue/green) over significant increases in resting state network from pre-treatment to post-treatment (red/yellow).</a:t>
+            </a:r>
+          </a:p>
+        </p:txBody>
+      </p:sp>
+      <p:sp>
+        <p:nvSpPr>
+          <p:cNvPr id="6" name="TextBox 5">
+            <a:extLst>
+              <a:ext uri="{FF2B5EF4-FFF2-40B4-BE49-F238E27FC236}">
+                <a16:creationId xmlns:a16="http://schemas.microsoft.com/office/drawing/2014/main" id="{C887F279-889F-8010-C5B6-972FF2B6102F}"/>
+              </a:ext>
+            </a:extLst>
+          </p:cNvPr>
+          <p:cNvSpPr txBox="1"/>
+          <p:nvPr/>
+        </p:nvSpPr>
+        <p:spPr>
+          <a:xfrm>
+            <a:off x="1890565" y="1307506"/>
+            <a:ext cx="370614" cy="461665"/>
+          </a:xfrm>
+          <a:prstGeom prst="rect">
+            <a:avLst/>
+          </a:prstGeom>
+          <a:noFill/>
+        </p:spPr>
+        <p:txBody>
           <a:bodyPr wrap="none" rtlCol="0">
             <a:spAutoFit/>
           </a:bodyPr>
           <a:lstStyle/>
           <a:p>
             <a:r>
-              <a:rPr lang="en-US" dirty="0"/>
-              <a:t>Red: Significant changes in network activation pre to post</a:t>
+              <a:rPr lang="en-US" sz="2400" b="1" dirty="0"/>
+              <a:t>A</a:t>
+            </a:r>
+          </a:p>
+        </p:txBody>
+      </p:sp>
+      <p:sp>
+        <p:nvSpPr>
+          <p:cNvPr id="7" name="TextBox 6">
+            <a:extLst>
+              <a:ext uri="{FF2B5EF4-FFF2-40B4-BE49-F238E27FC236}">
+                <a16:creationId xmlns:a16="http://schemas.microsoft.com/office/drawing/2014/main" id="{160D651B-DD82-7B99-32C6-E43592E3D790}"/>
+              </a:ext>
+            </a:extLst>
+          </p:cNvPr>
+          <p:cNvSpPr txBox="1"/>
+          <p:nvPr/>
+        </p:nvSpPr>
+        <p:spPr>
+          <a:xfrm>
+            <a:off x="6543599" y="1307505"/>
+            <a:ext cx="357790" cy="461665"/>
+          </a:xfrm>
+          <a:prstGeom prst="rect">
+            <a:avLst/>
+          </a:prstGeom>
+          <a:noFill/>
+        </p:spPr>
+        <p:txBody>
+          <a:bodyPr wrap="none" rtlCol="0">
+            <a:spAutoFit/>
+          </a:bodyPr>
+          <a:lstStyle/>
+          <a:p>
+            <a:r>
+              <a:rPr lang="en-US" sz="2400" b="1" dirty="0"/>
+              <a:t>B</a:t>
+            </a:r>
+          </a:p>
+        </p:txBody>
+      </p:sp>
+      <p:pic>
+        <p:nvPicPr>
+          <p:cNvPr id="9" name="Picture 8">
+            <a:extLst>
+              <a:ext uri="{FF2B5EF4-FFF2-40B4-BE49-F238E27FC236}">
+                <a16:creationId xmlns:a16="http://schemas.microsoft.com/office/drawing/2014/main" id="{9DC92D89-548C-7D3B-66BC-4E9A74179184}"/>
+              </a:ext>
+            </a:extLst>
+          </p:cNvPr>
+          <p:cNvPicPr>
+            <a:picLocks noChangeAspect="1"/>
+          </p:cNvPicPr>
+          <p:nvPr/>
+        </p:nvPicPr>
+        <p:blipFill>
+          <a:blip r:embed="rId4">
+            <a:extLst>
+              <a:ext uri="{28A0092B-C50C-407E-A947-70E740481C1C}">
+                <a14:useLocalDpi xmlns:a14="http://schemas.microsoft.com/office/drawing/2010/main" val="0"/>
+              </a:ext>
+            </a:extLst>
+          </a:blip>
+          <a:stretch>
+            <a:fillRect/>
+          </a:stretch>
+        </p:blipFill>
+        <p:spPr>
+          <a:xfrm>
+            <a:off x="9368023" y="4405891"/>
+            <a:ext cx="1866824" cy="75174"/>
+          </a:xfrm>
+          <a:prstGeom prst="rect">
+            <a:avLst/>
+          </a:prstGeom>
+        </p:spPr>
+      </p:pic>
+      <p:sp>
+        <p:nvSpPr>
+          <p:cNvPr id="10" name="TextBox 9">
+            <a:extLst>
+              <a:ext uri="{FF2B5EF4-FFF2-40B4-BE49-F238E27FC236}">
+                <a16:creationId xmlns:a16="http://schemas.microsoft.com/office/drawing/2014/main" id="{4B651923-2DAC-3EC4-35A5-D95E98B5F7B6}"/>
+              </a:ext>
+            </a:extLst>
+          </p:cNvPr>
+          <p:cNvSpPr txBox="1"/>
+          <p:nvPr/>
+        </p:nvSpPr>
+        <p:spPr>
+          <a:xfrm>
+            <a:off x="9270315" y="4419898"/>
+            <a:ext cx="2143016" cy="215444"/>
+          </a:xfrm>
+          <a:prstGeom prst="rect">
+            <a:avLst/>
+          </a:prstGeom>
+          <a:noFill/>
+        </p:spPr>
+        <p:txBody>
+          <a:bodyPr wrap="square" rtlCol="0">
+            <a:spAutoFit/>
+          </a:bodyPr>
+          <a:lstStyle/>
+          <a:p>
+            <a:r>
+              <a:rPr lang="en-US" sz="800" dirty="0"/>
+              <a:t>0              3.25                6.50            9.75        12.5</a:t>
+            </a:r>
+          </a:p>
+        </p:txBody>
+      </p:sp>
+      <p:pic>
+        <p:nvPicPr>
+          <p:cNvPr id="13" name="Picture 12">
+            <a:extLst>
+              <a:ext uri="{FF2B5EF4-FFF2-40B4-BE49-F238E27FC236}">
+                <a16:creationId xmlns:a16="http://schemas.microsoft.com/office/drawing/2014/main" id="{0B48A1AB-21A4-9998-19F1-FC75952C145D}"/>
+              </a:ext>
+            </a:extLst>
+          </p:cNvPr>
+          <p:cNvPicPr>
+            <a:picLocks noChangeAspect="1"/>
+          </p:cNvPicPr>
+          <p:nvPr/>
+        </p:nvPicPr>
+        <p:blipFill>
+          <a:blip r:embed="rId5">
+            <a:extLst>
+              <a:ext uri="{28A0092B-C50C-407E-A947-70E740481C1C}">
+                <a14:useLocalDpi xmlns:a14="http://schemas.microsoft.com/office/drawing/2010/main" val="0"/>
+              </a:ext>
+            </a:extLst>
+          </a:blip>
+          <a:stretch>
+            <a:fillRect/>
+          </a:stretch>
+        </p:blipFill>
+        <p:spPr>
+          <a:xfrm>
+            <a:off x="9368023" y="4699821"/>
+            <a:ext cx="1866824" cy="81166"/>
+          </a:xfrm>
+          <a:prstGeom prst="rect">
+            <a:avLst/>
+          </a:prstGeom>
+        </p:spPr>
+      </p:pic>
+      <p:sp>
+        <p:nvSpPr>
+          <p:cNvPr id="14" name="TextBox 13">
+            <a:extLst>
+              <a:ext uri="{FF2B5EF4-FFF2-40B4-BE49-F238E27FC236}">
+                <a16:creationId xmlns:a16="http://schemas.microsoft.com/office/drawing/2014/main" id="{296F416B-CE4A-A0F5-90F3-871256293F6E}"/>
+              </a:ext>
+            </a:extLst>
+          </p:cNvPr>
+          <p:cNvSpPr txBox="1"/>
+          <p:nvPr/>
+        </p:nvSpPr>
+        <p:spPr>
+          <a:xfrm>
+            <a:off x="9270315" y="4757724"/>
+            <a:ext cx="2143016" cy="215444"/>
+          </a:xfrm>
+          <a:prstGeom prst="rect">
+            <a:avLst/>
+          </a:prstGeom>
+          <a:noFill/>
+        </p:spPr>
+        <p:txBody>
+          <a:bodyPr wrap="square" rtlCol="0">
+            <a:spAutoFit/>
+          </a:bodyPr>
+          <a:lstStyle/>
+          <a:p>
+            <a:r>
+              <a:rPr lang="en-US" sz="800" dirty="0"/>
+              <a:t>0              1.5                     3              4.5                 6</a:t>
+            </a:r>
+          </a:p>
+        </p:txBody>
+      </p:sp>
+      <p:pic>
+        <p:nvPicPr>
+          <p:cNvPr id="15" name="Picture 14">
+            <a:extLst>
+              <a:ext uri="{FF2B5EF4-FFF2-40B4-BE49-F238E27FC236}">
+                <a16:creationId xmlns:a16="http://schemas.microsoft.com/office/drawing/2014/main" id="{8E12CC41-F4BA-849B-4BAA-5B5AA057FEC9}"/>
+              </a:ext>
+            </a:extLst>
+          </p:cNvPr>
+          <p:cNvPicPr>
+            <a:picLocks noChangeAspect="1"/>
+          </p:cNvPicPr>
+          <p:nvPr/>
+        </p:nvPicPr>
+        <p:blipFill>
+          <a:blip r:embed="rId5">
+            <a:extLst>
+              <a:ext uri="{28A0092B-C50C-407E-A947-70E740481C1C}">
+                <a14:useLocalDpi xmlns:a14="http://schemas.microsoft.com/office/drawing/2010/main" val="0"/>
+              </a:ext>
+            </a:extLst>
+          </a:blip>
+          <a:stretch>
+            <a:fillRect/>
+          </a:stretch>
+        </p:blipFill>
+        <p:spPr>
+          <a:xfrm>
+            <a:off x="4262623" y="4421400"/>
+            <a:ext cx="1866824" cy="81166"/>
+          </a:xfrm>
+          <a:prstGeom prst="rect">
+            <a:avLst/>
+          </a:prstGeom>
+        </p:spPr>
+      </p:pic>
+      <p:sp>
+        <p:nvSpPr>
+          <p:cNvPr id="16" name="TextBox 15">
+            <a:extLst>
+              <a:ext uri="{FF2B5EF4-FFF2-40B4-BE49-F238E27FC236}">
+                <a16:creationId xmlns:a16="http://schemas.microsoft.com/office/drawing/2014/main" id="{03B1E32E-2F46-77FA-51A9-ECBC7823A7ED}"/>
+              </a:ext>
+            </a:extLst>
+          </p:cNvPr>
+          <p:cNvSpPr txBox="1"/>
+          <p:nvPr/>
+        </p:nvSpPr>
+        <p:spPr>
+          <a:xfrm>
+            <a:off x="4164915" y="4479303"/>
+            <a:ext cx="2143016" cy="215444"/>
+          </a:xfrm>
+          <a:prstGeom prst="rect">
+            <a:avLst/>
+          </a:prstGeom>
+          <a:noFill/>
+        </p:spPr>
+        <p:txBody>
+          <a:bodyPr wrap="square" rtlCol="0">
+            <a:spAutoFit/>
+          </a:bodyPr>
+          <a:lstStyle/>
+          <a:p>
+            <a:r>
+              <a:rPr lang="en-US" sz="800" dirty="0"/>
+              <a:t>0              1.5                     3              4.5                 6</a:t>
             </a:r>
           </a:p>
         </p:txBody>
@@ -3397,7 +3720,7 @@
     </p:spTree>
     <p:extLst>
       <p:ext uri="{BB962C8B-B14F-4D97-AF65-F5344CB8AC3E}">
-        <p14:creationId xmlns:p14="http://schemas.microsoft.com/office/powerpoint/2010/main" val="4143191922"/>
+        <p14:creationId xmlns:p14="http://schemas.microsoft.com/office/powerpoint/2010/main" val="2074366714"/>
       </p:ext>
     </p:extLst>
   </p:cSld>
@@ -3426,10 +3749,10 @@
       </p:grpSpPr>
       <p:pic>
         <p:nvPicPr>
-          <p:cNvPr id="3" name="Picture 2" descr="A picture containing map&#10;&#10;Description automatically generated">
-            <a:extLst>
-              <a:ext uri="{FF2B5EF4-FFF2-40B4-BE49-F238E27FC236}">
-                <a16:creationId xmlns:a16="http://schemas.microsoft.com/office/drawing/2014/main" id="{645DD9C4-D658-5EC1-F876-B0D63E88E662}"/>
+          <p:cNvPr id="5" name="Picture 4" descr="A red line with black dots&#10;&#10;Description automatically generated with low confidence">
+            <a:extLst>
+              <a:ext uri="{FF2B5EF4-FFF2-40B4-BE49-F238E27FC236}">
+                <a16:creationId xmlns:a16="http://schemas.microsoft.com/office/drawing/2014/main" id="{5497A580-F099-73A9-0BE7-6DF46C03D487}"/>
               </a:ext>
             </a:extLst>
           </p:cNvPr>
@@ -3452,108 +3775,7 @@
         </p:blipFill>
         <p:spPr>
           <a:xfrm>
-            <a:off x="3572486" y="823483"/>
-            <a:ext cx="5047027" cy="5047027"/>
-          </a:xfrm>
-          <a:prstGeom prst="rect">
-            <a:avLst/>
-          </a:prstGeom>
-        </p:spPr>
-      </p:pic>
-      <p:sp>
-        <p:nvSpPr>
-          <p:cNvPr id="4" name="TextBox 3">
-            <a:extLst>
-              <a:ext uri="{FF2B5EF4-FFF2-40B4-BE49-F238E27FC236}">
-                <a16:creationId xmlns:a16="http://schemas.microsoft.com/office/drawing/2014/main" id="{539CE700-7F58-B559-4A72-54C9CD693C1B}"/>
-              </a:ext>
-            </a:extLst>
-          </p:cNvPr>
-          <p:cNvSpPr txBox="1"/>
-          <p:nvPr/>
-        </p:nvSpPr>
-        <p:spPr>
-          <a:xfrm>
-            <a:off x="4840448" y="823483"/>
-            <a:ext cx="4098814" cy="369332"/>
-          </a:xfrm>
-          <a:prstGeom prst="rect">
-            <a:avLst/>
-          </a:prstGeom>
-          <a:noFill/>
-        </p:spPr>
-        <p:txBody>
-          <a:bodyPr wrap="none" rtlCol="0">
-            <a:spAutoFit/>
-          </a:bodyPr>
-          <a:lstStyle/>
-          <a:p>
-            <a:r>
-              <a:rPr lang="en-US" dirty="0"/>
-              <a:t>Blue: network activation at pre-treatment</a:t>
-            </a:r>
-          </a:p>
-        </p:txBody>
-      </p:sp>
-    </p:spTree>
-    <p:extLst>
-      <p:ext uri="{BB962C8B-B14F-4D97-AF65-F5344CB8AC3E}">
-        <p14:creationId xmlns:p14="http://schemas.microsoft.com/office/powerpoint/2010/main" val="2074366714"/>
-      </p:ext>
-    </p:extLst>
-  </p:cSld>
-  <p:clrMapOvr>
-    <a:masterClrMapping/>
-  </p:clrMapOvr>
-</p:sld>
-</file>
-
-<file path=ppt/slides/slide3.xml><?xml version="1.0" encoding="utf-8"?>
-<p:sld xmlns:a="http://schemas.openxmlformats.org/drawingml/2006/main" xmlns:r="http://schemas.openxmlformats.org/officeDocument/2006/relationships" xmlns:p="http://schemas.openxmlformats.org/presentationml/2006/main">
-  <p:cSld>
-    <p:spTree>
-      <p:nvGrpSpPr>
-        <p:cNvPr id="1" name=""/>
-        <p:cNvGrpSpPr/>
-        <p:nvPr/>
-      </p:nvGrpSpPr>
-      <p:grpSpPr>
-        <a:xfrm>
-          <a:off x="0" y="0"/>
-          <a:ext cx="0" cy="0"/>
-          <a:chOff x="0" y="0"/>
-          <a:chExt cx="0" cy="0"/>
-        </a:xfrm>
-      </p:grpSpPr>
-      <p:pic>
-        <p:nvPicPr>
-          <p:cNvPr id="5" name="Picture 4" descr="A red line with black dots&#10;&#10;Description automatically generated with low confidence">
-            <a:extLst>
-              <a:ext uri="{FF2B5EF4-FFF2-40B4-BE49-F238E27FC236}">
-                <a16:creationId xmlns:a16="http://schemas.microsoft.com/office/drawing/2014/main" id="{5497A580-F099-73A9-0BE7-6DF46C03D487}"/>
-              </a:ext>
-            </a:extLst>
-          </p:cNvPr>
-          <p:cNvPicPr>
-            <a:picLocks noChangeAspect="1"/>
-          </p:cNvPicPr>
-          <p:nvPr/>
-        </p:nvPicPr>
-        <p:blipFill>
-          <a:blip r:embed="rId2">
-            <a:extLst>
-              <a:ext uri="{28A0092B-C50C-407E-A947-70E740481C1C}">
-                <a14:useLocalDpi xmlns:a14="http://schemas.microsoft.com/office/drawing/2010/main" val="0"/>
-              </a:ext>
-            </a:extLst>
-          </a:blip>
-          <a:stretch>
-            <a:fillRect/>
-          </a:stretch>
-        </p:blipFill>
-        <p:spPr>
-          <a:xfrm>
-            <a:off x="2460557" y="1005371"/>
+            <a:off x="2334722" y="460087"/>
             <a:ext cx="7270886" cy="4847257"/>
           </a:xfrm>
           <a:prstGeom prst="rect">
@@ -3575,7 +3797,7 @@
         </p:nvSpPr>
         <p:spPr>
           <a:xfrm>
-            <a:off x="4607767" y="543059"/>
+            <a:off x="4607767" y="58723"/>
             <a:ext cx="2976465" cy="523220"/>
           </a:xfrm>
           <a:prstGeom prst="rect">
@@ -3596,6 +3818,41 @@
                 <a:cs typeface="Arial" panose="020B0604020202020204" pitchFamily="34" charset="0"/>
               </a:rPr>
               <a:t>Amygdala</a:t>
+            </a:r>
+          </a:p>
+        </p:txBody>
+      </p:sp>
+      <p:sp>
+        <p:nvSpPr>
+          <p:cNvPr id="2" name="TextBox 1">
+            <a:extLst>
+              <a:ext uri="{FF2B5EF4-FFF2-40B4-BE49-F238E27FC236}">
+                <a16:creationId xmlns:a16="http://schemas.microsoft.com/office/drawing/2014/main" id="{7D99A171-9B13-FE0F-B929-1B9130765028}"/>
+              </a:ext>
+            </a:extLst>
+          </p:cNvPr>
+          <p:cNvSpPr txBox="1"/>
+          <p:nvPr/>
+        </p:nvSpPr>
+        <p:spPr>
+          <a:xfrm>
+            <a:off x="1409351" y="5380672"/>
+            <a:ext cx="9496338" cy="1077218"/>
+          </a:xfrm>
+          <a:prstGeom prst="rect">
+            <a:avLst/>
+          </a:prstGeom>
+          <a:noFill/>
+        </p:spPr>
+        <p:txBody>
+          <a:bodyPr wrap="square" rtlCol="0">
+            <a:spAutoFit/>
+          </a:bodyPr>
+          <a:lstStyle/>
+          <a:p>
+            <a:r>
+              <a:rPr lang="en-US" sz="1600" dirty="0"/>
+              <a:t>Caption: Change in amygdala response correlated with change in resting state network connectivity. Greater increases in network connectivity post-treatment minus pre-treatment were significantly correlated with greater reductions in amygdala responses post-treatment minus pre-treatment when controlling for time between assessments, number of phobias, and days of neuro-reinforcement (p &lt; 0.05).</a:t>
             </a:r>
           </a:p>
         </p:txBody>

</xml_diff>

<commit_message>
exported figures to send to cody
</commit_message>
<xml_diff>
--- a/restingstate_figures.pptx
+++ b/restingstate_figures.pptx
@@ -4,6 +4,9 @@
   <p:sldMasterIdLst>
     <p:sldMasterId id="2147483648" r:id="rId1"/>
   </p:sldMasterIdLst>
+  <p:notesMasterIdLst>
+    <p:notesMasterId r:id="rId4"/>
+  </p:notesMasterIdLst>
   <p:sldIdLst>
     <p:sldId id="257" r:id="rId2"/>
     <p:sldId id="258" r:id="rId3"/>
@@ -111,6 +114,355 @@
     </p:ext>
   </p:extLst>
 </p:presentation>
+</file>
+
+<file path=ppt/notesMasters/notesMaster1.xml><?xml version="1.0" encoding="utf-8"?>
+<p:notesMaster xmlns:a="http://schemas.openxmlformats.org/drawingml/2006/main" xmlns:r="http://schemas.openxmlformats.org/officeDocument/2006/relationships" xmlns:p="http://schemas.openxmlformats.org/presentationml/2006/main">
+  <p:cSld>
+    <p:bg>
+      <p:bgRef idx="1001">
+        <a:schemeClr val="bg1"/>
+      </p:bgRef>
+    </p:bg>
+    <p:spTree>
+      <p:nvGrpSpPr>
+        <p:cNvPr id="1" name=""/>
+        <p:cNvGrpSpPr/>
+        <p:nvPr/>
+      </p:nvGrpSpPr>
+      <p:grpSpPr>
+        <a:xfrm>
+          <a:off x="0" y="0"/>
+          <a:ext cx="0" cy="0"/>
+          <a:chOff x="0" y="0"/>
+          <a:chExt cx="0" cy="0"/>
+        </a:xfrm>
+      </p:grpSpPr>
+      <p:sp>
+        <p:nvSpPr>
+          <p:cNvPr id="2" name="Header Placeholder 1"/>
+          <p:cNvSpPr>
+            <a:spLocks noGrp="1"/>
+          </p:cNvSpPr>
+          <p:nvPr>
+            <p:ph type="hdr" sz="quarter"/>
+          </p:nvPr>
+        </p:nvSpPr>
+        <p:spPr>
+          <a:xfrm>
+            <a:off x="0" y="0"/>
+            <a:ext cx="2971800" cy="458788"/>
+          </a:xfrm>
+          <a:prstGeom prst="rect">
+            <a:avLst/>
+          </a:prstGeom>
+        </p:spPr>
+        <p:txBody>
+          <a:bodyPr vert="horz" lIns="91440" tIns="45720" rIns="91440" bIns="45720" rtlCol="0"/>
+          <a:lstStyle>
+            <a:lvl1pPr algn="l">
+              <a:defRPr sz="1200"/>
+            </a:lvl1pPr>
+          </a:lstStyle>
+          <a:p>
+            <a:endParaRPr lang="en-US"/>
+          </a:p>
+        </p:txBody>
+      </p:sp>
+      <p:sp>
+        <p:nvSpPr>
+          <p:cNvPr id="3" name="Date Placeholder 2"/>
+          <p:cNvSpPr>
+            <a:spLocks noGrp="1"/>
+          </p:cNvSpPr>
+          <p:nvPr>
+            <p:ph type="dt" idx="1"/>
+          </p:nvPr>
+        </p:nvSpPr>
+        <p:spPr>
+          <a:xfrm>
+            <a:off x="3884613" y="0"/>
+            <a:ext cx="2971800" cy="458788"/>
+          </a:xfrm>
+          <a:prstGeom prst="rect">
+            <a:avLst/>
+          </a:prstGeom>
+        </p:spPr>
+        <p:txBody>
+          <a:bodyPr vert="horz" lIns="91440" tIns="45720" rIns="91440" bIns="45720" rtlCol="0"/>
+          <a:lstStyle>
+            <a:lvl1pPr algn="r">
+              <a:defRPr sz="1200"/>
+            </a:lvl1pPr>
+          </a:lstStyle>
+          <a:p>
+            <a:fld id="{6A55DAFD-ECC9-4E86-9372-AA175A96D8F5}" type="datetimeFigureOut">
+              <a:rPr lang="en-US" smtClean="0"/>
+              <a:t>6/2/2023</a:t>
+            </a:fld>
+            <a:endParaRPr lang="en-US"/>
+          </a:p>
+        </p:txBody>
+      </p:sp>
+      <p:sp>
+        <p:nvSpPr>
+          <p:cNvPr id="4" name="Slide Image Placeholder 3"/>
+          <p:cNvSpPr>
+            <a:spLocks noGrp="1" noRot="1" noChangeAspect="1"/>
+          </p:cNvSpPr>
+          <p:nvPr>
+            <p:ph type="sldImg" idx="2"/>
+          </p:nvPr>
+        </p:nvSpPr>
+        <p:spPr>
+          <a:xfrm>
+            <a:off x="685800" y="1143000"/>
+            <a:ext cx="5486400" cy="3086100"/>
+          </a:xfrm>
+          <a:prstGeom prst="rect">
+            <a:avLst/>
+          </a:prstGeom>
+          <a:noFill/>
+          <a:ln w="12700">
+            <a:solidFill>
+              <a:prstClr val="black"/>
+            </a:solidFill>
+          </a:ln>
+        </p:spPr>
+        <p:txBody>
+          <a:bodyPr vert="horz" lIns="91440" tIns="45720" rIns="91440" bIns="45720" rtlCol="0" anchor="ctr"/>
+          <a:lstStyle/>
+          <a:p>
+            <a:endParaRPr lang="en-US"/>
+          </a:p>
+        </p:txBody>
+      </p:sp>
+      <p:sp>
+        <p:nvSpPr>
+          <p:cNvPr id="5" name="Notes Placeholder 4"/>
+          <p:cNvSpPr>
+            <a:spLocks noGrp="1"/>
+          </p:cNvSpPr>
+          <p:nvPr>
+            <p:ph type="body" sz="quarter" idx="3"/>
+          </p:nvPr>
+        </p:nvSpPr>
+        <p:spPr>
+          <a:xfrm>
+            <a:off x="685800" y="4400550"/>
+            <a:ext cx="5486400" cy="3600450"/>
+          </a:xfrm>
+          <a:prstGeom prst="rect">
+            <a:avLst/>
+          </a:prstGeom>
+        </p:spPr>
+        <p:txBody>
+          <a:bodyPr vert="horz" lIns="91440" tIns="45720" rIns="91440" bIns="45720" rtlCol="0"/>
+          <a:lstStyle/>
+          <a:p>
+            <a:pPr lvl="0"/>
+            <a:r>
+              <a:rPr lang="en-US"/>
+              <a:t>Click to edit Master text styles</a:t>
+            </a:r>
+          </a:p>
+          <a:p>
+            <a:pPr lvl="1"/>
+            <a:r>
+              <a:rPr lang="en-US"/>
+              <a:t>Second level</a:t>
+            </a:r>
+          </a:p>
+          <a:p>
+            <a:pPr lvl="2"/>
+            <a:r>
+              <a:rPr lang="en-US"/>
+              <a:t>Third level</a:t>
+            </a:r>
+          </a:p>
+          <a:p>
+            <a:pPr lvl="3"/>
+            <a:r>
+              <a:rPr lang="en-US"/>
+              <a:t>Fourth level</a:t>
+            </a:r>
+          </a:p>
+          <a:p>
+            <a:pPr lvl="4"/>
+            <a:r>
+              <a:rPr lang="en-US"/>
+              <a:t>Fifth level</a:t>
+            </a:r>
+          </a:p>
+        </p:txBody>
+      </p:sp>
+      <p:sp>
+        <p:nvSpPr>
+          <p:cNvPr id="6" name="Footer Placeholder 5"/>
+          <p:cNvSpPr>
+            <a:spLocks noGrp="1"/>
+          </p:cNvSpPr>
+          <p:nvPr>
+            <p:ph type="ftr" sz="quarter" idx="4"/>
+          </p:nvPr>
+        </p:nvSpPr>
+        <p:spPr>
+          <a:xfrm>
+            <a:off x="0" y="8685213"/>
+            <a:ext cx="2971800" cy="458787"/>
+          </a:xfrm>
+          <a:prstGeom prst="rect">
+            <a:avLst/>
+          </a:prstGeom>
+        </p:spPr>
+        <p:txBody>
+          <a:bodyPr vert="horz" lIns="91440" tIns="45720" rIns="91440" bIns="45720" rtlCol="0" anchor="b"/>
+          <a:lstStyle>
+            <a:lvl1pPr algn="l">
+              <a:defRPr sz="1200"/>
+            </a:lvl1pPr>
+          </a:lstStyle>
+          <a:p>
+            <a:endParaRPr lang="en-US"/>
+          </a:p>
+        </p:txBody>
+      </p:sp>
+      <p:sp>
+        <p:nvSpPr>
+          <p:cNvPr id="7" name="Slide Number Placeholder 6"/>
+          <p:cNvSpPr>
+            <a:spLocks noGrp="1"/>
+          </p:cNvSpPr>
+          <p:nvPr>
+            <p:ph type="sldNum" sz="quarter" idx="5"/>
+          </p:nvPr>
+        </p:nvSpPr>
+        <p:spPr>
+          <a:xfrm>
+            <a:off x="3884613" y="8685213"/>
+            <a:ext cx="2971800" cy="458787"/>
+          </a:xfrm>
+          <a:prstGeom prst="rect">
+            <a:avLst/>
+          </a:prstGeom>
+        </p:spPr>
+        <p:txBody>
+          <a:bodyPr vert="horz" lIns="91440" tIns="45720" rIns="91440" bIns="45720" rtlCol="0" anchor="b"/>
+          <a:lstStyle>
+            <a:lvl1pPr algn="r">
+              <a:defRPr sz="1200"/>
+            </a:lvl1pPr>
+          </a:lstStyle>
+          <a:p>
+            <a:fld id="{7947D4C0-D290-4160-8350-BBEA855E6472}" type="slidenum">
+              <a:rPr lang="en-US" smtClean="0"/>
+              <a:t>‹#›</a:t>
+            </a:fld>
+            <a:endParaRPr lang="en-US"/>
+          </a:p>
+        </p:txBody>
+      </p:sp>
+    </p:spTree>
+    <p:extLst>
+      <p:ext uri="{BB962C8B-B14F-4D97-AF65-F5344CB8AC3E}">
+        <p14:creationId xmlns:p14="http://schemas.microsoft.com/office/powerpoint/2010/main" val="780925377"/>
+      </p:ext>
+    </p:extLst>
+  </p:cSld>
+  <p:clrMap bg1="lt1" tx1="dk1" bg2="lt2" tx2="dk2" accent1="accent1" accent2="accent2" accent3="accent3" accent4="accent4" accent5="accent5" accent6="accent6" hlink="hlink" folHlink="folHlink"/>
+  <p:notesStyle>
+    <a:lvl1pPr marL="0" algn="l" defTabSz="914400" rtl="0" eaLnBrk="1" latinLnBrk="0" hangingPunct="1">
+      <a:defRPr sz="1200" kern="1200">
+        <a:solidFill>
+          <a:schemeClr val="tx1"/>
+        </a:solidFill>
+        <a:latin typeface="+mn-lt"/>
+        <a:ea typeface="+mn-ea"/>
+        <a:cs typeface="+mn-cs"/>
+      </a:defRPr>
+    </a:lvl1pPr>
+    <a:lvl2pPr marL="457200" algn="l" defTabSz="914400" rtl="0" eaLnBrk="1" latinLnBrk="0" hangingPunct="1">
+      <a:defRPr sz="1200" kern="1200">
+        <a:solidFill>
+          <a:schemeClr val="tx1"/>
+        </a:solidFill>
+        <a:latin typeface="+mn-lt"/>
+        <a:ea typeface="+mn-ea"/>
+        <a:cs typeface="+mn-cs"/>
+      </a:defRPr>
+    </a:lvl2pPr>
+    <a:lvl3pPr marL="914400" algn="l" defTabSz="914400" rtl="0" eaLnBrk="1" latinLnBrk="0" hangingPunct="1">
+      <a:defRPr sz="1200" kern="1200">
+        <a:solidFill>
+          <a:schemeClr val="tx1"/>
+        </a:solidFill>
+        <a:latin typeface="+mn-lt"/>
+        <a:ea typeface="+mn-ea"/>
+        <a:cs typeface="+mn-cs"/>
+      </a:defRPr>
+    </a:lvl3pPr>
+    <a:lvl4pPr marL="1371600" algn="l" defTabSz="914400" rtl="0" eaLnBrk="1" latinLnBrk="0" hangingPunct="1">
+      <a:defRPr sz="1200" kern="1200">
+        <a:solidFill>
+          <a:schemeClr val="tx1"/>
+        </a:solidFill>
+        <a:latin typeface="+mn-lt"/>
+        <a:ea typeface="+mn-ea"/>
+        <a:cs typeface="+mn-cs"/>
+      </a:defRPr>
+    </a:lvl4pPr>
+    <a:lvl5pPr marL="1828800" algn="l" defTabSz="914400" rtl="0" eaLnBrk="1" latinLnBrk="0" hangingPunct="1">
+      <a:defRPr sz="1200" kern="1200">
+        <a:solidFill>
+          <a:schemeClr val="tx1"/>
+        </a:solidFill>
+        <a:latin typeface="+mn-lt"/>
+        <a:ea typeface="+mn-ea"/>
+        <a:cs typeface="+mn-cs"/>
+      </a:defRPr>
+    </a:lvl5pPr>
+    <a:lvl6pPr marL="2286000" algn="l" defTabSz="914400" rtl="0" eaLnBrk="1" latinLnBrk="0" hangingPunct="1">
+      <a:defRPr sz="1200" kern="1200">
+        <a:solidFill>
+          <a:schemeClr val="tx1"/>
+        </a:solidFill>
+        <a:latin typeface="+mn-lt"/>
+        <a:ea typeface="+mn-ea"/>
+        <a:cs typeface="+mn-cs"/>
+      </a:defRPr>
+    </a:lvl6pPr>
+    <a:lvl7pPr marL="2743200" algn="l" defTabSz="914400" rtl="0" eaLnBrk="1" latinLnBrk="0" hangingPunct="1">
+      <a:defRPr sz="1200" kern="1200">
+        <a:solidFill>
+          <a:schemeClr val="tx1"/>
+        </a:solidFill>
+        <a:latin typeface="+mn-lt"/>
+        <a:ea typeface="+mn-ea"/>
+        <a:cs typeface="+mn-cs"/>
+      </a:defRPr>
+    </a:lvl7pPr>
+    <a:lvl8pPr marL="3200400" algn="l" defTabSz="914400" rtl="0" eaLnBrk="1" latinLnBrk="0" hangingPunct="1">
+      <a:defRPr sz="1200" kern="1200">
+        <a:solidFill>
+          <a:schemeClr val="tx1"/>
+        </a:solidFill>
+        <a:latin typeface="+mn-lt"/>
+        <a:ea typeface="+mn-ea"/>
+        <a:cs typeface="+mn-cs"/>
+      </a:defRPr>
+    </a:lvl8pPr>
+    <a:lvl9pPr marL="3657600" algn="l" defTabSz="914400" rtl="0" eaLnBrk="1" latinLnBrk="0" hangingPunct="1">
+      <a:defRPr sz="1200" kern="1200">
+        <a:solidFill>
+          <a:schemeClr val="tx1"/>
+        </a:solidFill>
+        <a:latin typeface="+mn-lt"/>
+        <a:ea typeface="+mn-ea"/>
+        <a:cs typeface="+mn-cs"/>
+      </a:defRPr>
+    </a:lvl9pPr>
+  </p:notesStyle>
+</p:notesMaster>
 </file>
 
 <file path=ppt/slideLayouts/slideLayout1.xml><?xml version="1.0" encoding="utf-8"?>
@@ -3355,7 +3707,7 @@
         </p:blipFill>
         <p:spPr>
           <a:xfrm>
-            <a:off x="6809649" y="1173952"/>
+            <a:off x="4550774" y="1264751"/>
             <a:ext cx="3600695" cy="3600695"/>
           </a:xfrm>
           <a:prstGeom prst="rect">
@@ -3363,12 +3715,47 @@
           </a:prstGeom>
         </p:spPr>
       </p:pic>
+      <p:sp>
+        <p:nvSpPr>
+          <p:cNvPr id="5" name="TextBox 4">
+            <a:extLst>
+              <a:ext uri="{FF2B5EF4-FFF2-40B4-BE49-F238E27FC236}">
+                <a16:creationId xmlns:a16="http://schemas.microsoft.com/office/drawing/2014/main" id="{2C1E8CCE-067B-B6CA-96E9-633E6EE25799}"/>
+              </a:ext>
+            </a:extLst>
+          </p:cNvPr>
+          <p:cNvSpPr txBox="1"/>
+          <p:nvPr/>
+        </p:nvSpPr>
+        <p:spPr>
+          <a:xfrm>
+            <a:off x="2101705" y="5538302"/>
+            <a:ext cx="8498832" cy="923330"/>
+          </a:xfrm>
+          <a:prstGeom prst="rect">
+            <a:avLst/>
+          </a:prstGeom>
+          <a:noFill/>
+        </p:spPr>
+        <p:txBody>
+          <a:bodyPr wrap="square" rtlCol="0">
+            <a:spAutoFit/>
+          </a:bodyPr>
+          <a:lstStyle/>
+          <a:p>
+            <a:r>
+              <a:rPr lang="en-US" dirty="0"/>
+              <a:t>Caption: Maps of resting state network activation. Resting state network activation at pre-treatment (blue/green) over significant increases in resting state network from pre-treatment to post-treatment (red/yellow).</a:t>
+            </a:r>
+          </a:p>
+        </p:txBody>
+      </p:sp>
       <p:pic>
         <p:nvPicPr>
-          <p:cNvPr id="2" name="Picture 1" descr="A picture containing brain, art, reef&#10;&#10;Description automatically generated">
-            <a:extLst>
-              <a:ext uri="{FF2B5EF4-FFF2-40B4-BE49-F238E27FC236}">
-                <a16:creationId xmlns:a16="http://schemas.microsoft.com/office/drawing/2014/main" id="{5506DEF2-E30E-0690-AE51-75B412F5F208}"/>
+          <p:cNvPr id="9" name="Picture 8">
+            <a:extLst>
+              <a:ext uri="{FF2B5EF4-FFF2-40B4-BE49-F238E27FC236}">
+                <a16:creationId xmlns:a16="http://schemas.microsoft.com/office/drawing/2014/main" id="{9DC92D89-548C-7D3B-66BC-4E9A74179184}"/>
               </a:ext>
             </a:extLst>
           </p:cNvPr>
@@ -3391,8 +3778,8 @@
         </p:blipFill>
         <p:spPr>
           <a:xfrm>
-            <a:off x="1890565" y="1095381"/>
-            <a:ext cx="3757838" cy="3757838"/>
+            <a:off x="7472111" y="4329032"/>
+            <a:ext cx="1866824" cy="75174"/>
           </a:xfrm>
           <a:prstGeom prst="rect">
             <a:avLst/>
@@ -3401,10 +3788,10 @@
       </p:pic>
       <p:sp>
         <p:nvSpPr>
-          <p:cNvPr id="5" name="TextBox 4">
-            <a:extLst>
-              <a:ext uri="{FF2B5EF4-FFF2-40B4-BE49-F238E27FC236}">
-                <a16:creationId xmlns:a16="http://schemas.microsoft.com/office/drawing/2014/main" id="{2C1E8CCE-067B-B6CA-96E9-633E6EE25799}"/>
+          <p:cNvPr id="10" name="TextBox 9">
+            <a:extLst>
+              <a:ext uri="{FF2B5EF4-FFF2-40B4-BE49-F238E27FC236}">
+                <a16:creationId xmlns:a16="http://schemas.microsoft.com/office/drawing/2014/main" id="{4B651923-2DAC-3EC4-35A5-D95E98B5F7B6}"/>
               </a:ext>
             </a:extLst>
           </p:cNvPr>
@@ -3413,8 +3800,8 @@
         </p:nvSpPr>
         <p:spPr>
           <a:xfrm>
-            <a:off x="2101706" y="5298314"/>
-            <a:ext cx="8498832" cy="1200329"/>
+            <a:off x="7374403" y="4360636"/>
+            <a:ext cx="3808123" cy="261610"/>
           </a:xfrm>
           <a:prstGeom prst="rect">
             <a:avLst/>
@@ -3428,88 +3815,18 @@
           <a:lstStyle/>
           <a:p>
             <a:r>
-              <a:rPr lang="en-US" dirty="0"/>
-              <a:t>Caption: Maps of resting state network activation. (A) Significant increases in resting state network activation from pre-treatment to post-treatment. (B) Resting state network activation at pre-treatment (blue/green) over significant increases in resting state network from pre-treatment to post-treatment (red/yellow).</a:t>
-            </a:r>
-          </a:p>
-        </p:txBody>
-      </p:sp>
-      <p:sp>
-        <p:nvSpPr>
-          <p:cNvPr id="6" name="TextBox 5">
-            <a:extLst>
-              <a:ext uri="{FF2B5EF4-FFF2-40B4-BE49-F238E27FC236}">
-                <a16:creationId xmlns:a16="http://schemas.microsoft.com/office/drawing/2014/main" id="{C887F279-889F-8010-C5B6-972FF2B6102F}"/>
-              </a:ext>
-            </a:extLst>
-          </p:cNvPr>
-          <p:cNvSpPr txBox="1"/>
-          <p:nvPr/>
-        </p:nvSpPr>
-        <p:spPr>
-          <a:xfrm>
-            <a:off x="1890565" y="1307506"/>
-            <a:ext cx="370614" cy="461665"/>
-          </a:xfrm>
-          <a:prstGeom prst="rect">
-            <a:avLst/>
-          </a:prstGeom>
-          <a:noFill/>
-        </p:spPr>
-        <p:txBody>
-          <a:bodyPr wrap="none" rtlCol="0">
-            <a:spAutoFit/>
-          </a:bodyPr>
-          <a:lstStyle/>
-          <a:p>
-            <a:r>
-              <a:rPr lang="en-US" sz="2400" b="1" dirty="0"/>
-              <a:t>A</a:t>
-            </a:r>
-          </a:p>
-        </p:txBody>
-      </p:sp>
-      <p:sp>
-        <p:nvSpPr>
-          <p:cNvPr id="7" name="TextBox 6">
-            <a:extLst>
-              <a:ext uri="{FF2B5EF4-FFF2-40B4-BE49-F238E27FC236}">
-                <a16:creationId xmlns:a16="http://schemas.microsoft.com/office/drawing/2014/main" id="{160D651B-DD82-7B99-32C6-E43592E3D790}"/>
-              </a:ext>
-            </a:extLst>
-          </p:cNvPr>
-          <p:cNvSpPr txBox="1"/>
-          <p:nvPr/>
-        </p:nvSpPr>
-        <p:spPr>
-          <a:xfrm>
-            <a:off x="6543599" y="1307505"/>
-            <a:ext cx="357790" cy="461665"/>
-          </a:xfrm>
-          <a:prstGeom prst="rect">
-            <a:avLst/>
-          </a:prstGeom>
-          <a:noFill/>
-        </p:spPr>
-        <p:txBody>
-          <a:bodyPr wrap="none" rtlCol="0">
-            <a:spAutoFit/>
-          </a:bodyPr>
-          <a:lstStyle/>
-          <a:p>
-            <a:r>
-              <a:rPr lang="en-US" sz="2400" b="1" dirty="0"/>
-              <a:t>B</a:t>
+              <a:rPr lang="en-US" sz="1100" dirty="0"/>
+              <a:t>0                      6.25                   12.5</a:t>
             </a:r>
           </a:p>
         </p:txBody>
       </p:sp>
       <p:pic>
         <p:nvPicPr>
-          <p:cNvPr id="9" name="Picture 8">
-            <a:extLst>
-              <a:ext uri="{FF2B5EF4-FFF2-40B4-BE49-F238E27FC236}">
-                <a16:creationId xmlns:a16="http://schemas.microsoft.com/office/drawing/2014/main" id="{9DC92D89-548C-7D3B-66BC-4E9A74179184}"/>
+          <p:cNvPr id="13" name="Picture 12">
+            <a:extLst>
+              <a:ext uri="{FF2B5EF4-FFF2-40B4-BE49-F238E27FC236}">
+                <a16:creationId xmlns:a16="http://schemas.microsoft.com/office/drawing/2014/main" id="{0B48A1AB-21A4-9998-19F1-FC75952C145D}"/>
               </a:ext>
             </a:extLst>
           </p:cNvPr>
@@ -3532,78 +3849,7 @@
         </p:blipFill>
         <p:spPr>
           <a:xfrm>
-            <a:off x="9368023" y="4405891"/>
-            <a:ext cx="1866824" cy="75174"/>
-          </a:xfrm>
-          <a:prstGeom prst="rect">
-            <a:avLst/>
-          </a:prstGeom>
-        </p:spPr>
-      </p:pic>
-      <p:sp>
-        <p:nvSpPr>
-          <p:cNvPr id="10" name="TextBox 9">
-            <a:extLst>
-              <a:ext uri="{FF2B5EF4-FFF2-40B4-BE49-F238E27FC236}">
-                <a16:creationId xmlns:a16="http://schemas.microsoft.com/office/drawing/2014/main" id="{4B651923-2DAC-3EC4-35A5-D95E98B5F7B6}"/>
-              </a:ext>
-            </a:extLst>
-          </p:cNvPr>
-          <p:cNvSpPr txBox="1"/>
-          <p:nvPr/>
-        </p:nvSpPr>
-        <p:spPr>
-          <a:xfrm>
-            <a:off x="9270315" y="4419898"/>
-            <a:ext cx="2143016" cy="215444"/>
-          </a:xfrm>
-          <a:prstGeom prst="rect">
-            <a:avLst/>
-          </a:prstGeom>
-          <a:noFill/>
-        </p:spPr>
-        <p:txBody>
-          <a:bodyPr wrap="square" rtlCol="0">
-            <a:spAutoFit/>
-          </a:bodyPr>
-          <a:lstStyle/>
-          <a:p>
-            <a:r>
-              <a:rPr lang="en-US" sz="800" dirty="0"/>
-              <a:t>0              3.25                6.50            9.75        12.5</a:t>
-            </a:r>
-          </a:p>
-        </p:txBody>
-      </p:sp>
-      <p:pic>
-        <p:nvPicPr>
-          <p:cNvPr id="13" name="Picture 12">
-            <a:extLst>
-              <a:ext uri="{FF2B5EF4-FFF2-40B4-BE49-F238E27FC236}">
-                <a16:creationId xmlns:a16="http://schemas.microsoft.com/office/drawing/2014/main" id="{0B48A1AB-21A4-9998-19F1-FC75952C145D}"/>
-              </a:ext>
-            </a:extLst>
-          </p:cNvPr>
-          <p:cNvPicPr>
-            <a:picLocks noChangeAspect="1"/>
-          </p:cNvPicPr>
-          <p:nvPr/>
-        </p:nvPicPr>
-        <p:blipFill>
-          <a:blip r:embed="rId5">
-            <a:extLst>
-              <a:ext uri="{28A0092B-C50C-407E-A947-70E740481C1C}">
-                <a14:useLocalDpi xmlns:a14="http://schemas.microsoft.com/office/drawing/2010/main" val="0"/>
-              </a:ext>
-            </a:extLst>
-          </a:blip>
-          <a:stretch>
-            <a:fillRect/>
-          </a:stretch>
-        </p:blipFill>
-        <p:spPr>
-          <a:xfrm>
-            <a:off x="9368023" y="4699821"/>
+            <a:off x="7472111" y="4866153"/>
             <a:ext cx="1866824" cy="81166"/>
           </a:xfrm>
           <a:prstGeom prst="rect">
@@ -3625,8 +3871,8 @@
         </p:nvSpPr>
         <p:spPr>
           <a:xfrm>
-            <a:off x="9270315" y="4757724"/>
-            <a:ext cx="2143016" cy="215444"/>
+            <a:off x="7374403" y="4935611"/>
+            <a:ext cx="2143016" cy="261610"/>
           </a:xfrm>
           <a:prstGeom prst="rect">
             <a:avLst/>
@@ -3640,64 +3886,28 @@
           <a:lstStyle/>
           <a:p>
             <a:r>
-              <a:rPr lang="en-US" sz="800" dirty="0"/>
-              <a:t>0                1.5                    3              4.5                 6</a:t>
-            </a:r>
-          </a:p>
-        </p:txBody>
-      </p:sp>
-      <p:pic>
-        <p:nvPicPr>
-          <p:cNvPr id="15" name="Picture 14">
-            <a:extLst>
-              <a:ext uri="{FF2B5EF4-FFF2-40B4-BE49-F238E27FC236}">
-                <a16:creationId xmlns:a16="http://schemas.microsoft.com/office/drawing/2014/main" id="{8E12CC41-F4BA-849B-4BAA-5B5AA057FEC9}"/>
-              </a:ext>
-            </a:extLst>
-          </p:cNvPr>
-          <p:cNvPicPr>
-            <a:picLocks noChangeAspect="1"/>
-          </p:cNvPicPr>
+              <a:rPr lang="en-US" sz="1100" dirty="0"/>
+              <a:t>0                         3                           6</a:t>
+            </a:r>
+          </a:p>
+        </p:txBody>
+      </p:sp>
+      <p:sp>
+        <p:nvSpPr>
+          <p:cNvPr id="4" name="TextBox 3">
+            <a:extLst>
+              <a:ext uri="{FF2B5EF4-FFF2-40B4-BE49-F238E27FC236}">
+                <a16:creationId xmlns:a16="http://schemas.microsoft.com/office/drawing/2014/main" id="{BE9974EC-69BA-E4F3-CF5D-0324A9B490C4}"/>
+              </a:ext>
+            </a:extLst>
+          </p:cNvPr>
+          <p:cNvSpPr txBox="1"/>
           <p:nvPr/>
-        </p:nvPicPr>
-        <p:blipFill>
-          <a:blip r:embed="rId5">
-            <a:extLst>
-              <a:ext uri="{28A0092B-C50C-407E-A947-70E740481C1C}">
-                <a14:useLocalDpi xmlns:a14="http://schemas.microsoft.com/office/drawing/2010/main" val="0"/>
-              </a:ext>
-            </a:extLst>
-          </a:blip>
-          <a:stretch>
-            <a:fillRect/>
-          </a:stretch>
-        </p:blipFill>
+        </p:nvSpPr>
         <p:spPr>
           <a:xfrm>
-            <a:off x="4262623" y="4421400"/>
-            <a:ext cx="1866824" cy="81166"/>
-          </a:xfrm>
-          <a:prstGeom prst="rect">
-            <a:avLst/>
-          </a:prstGeom>
-        </p:spPr>
-      </p:pic>
-      <p:sp>
-        <p:nvSpPr>
-          <p:cNvPr id="16" name="TextBox 15">
-            <a:extLst>
-              <a:ext uri="{FF2B5EF4-FFF2-40B4-BE49-F238E27FC236}">
-                <a16:creationId xmlns:a16="http://schemas.microsoft.com/office/drawing/2014/main" id="{03B1E32E-2F46-77FA-51A9-ECBC7823A7ED}"/>
-              </a:ext>
-            </a:extLst>
-          </p:cNvPr>
-          <p:cNvSpPr txBox="1"/>
-          <p:nvPr/>
-        </p:nvSpPr>
-        <p:spPr>
-          <a:xfrm>
-            <a:off x="4164915" y="4479303"/>
-            <a:ext cx="2143016" cy="215444"/>
+            <a:off x="8122894" y="4509315"/>
+            <a:ext cx="494046" cy="261610"/>
           </a:xfrm>
           <a:prstGeom prst="rect">
             <a:avLst/>
@@ -3705,14 +3915,49 @@
           <a:noFill/>
         </p:spPr>
         <p:txBody>
-          <a:bodyPr wrap="square" rtlCol="0">
+          <a:bodyPr wrap="none" rtlCol="0">
             <a:spAutoFit/>
           </a:bodyPr>
           <a:lstStyle/>
           <a:p>
             <a:r>
-              <a:rPr lang="en-US" sz="800" dirty="0"/>
-              <a:t>0              1.5                   3                4.5                 6</a:t>
+              <a:rPr lang="en-US" sz="1100" i="1" dirty="0"/>
+              <a:t>t-stat</a:t>
+            </a:r>
+          </a:p>
+        </p:txBody>
+      </p:sp>
+      <p:sp>
+        <p:nvSpPr>
+          <p:cNvPr id="8" name="TextBox 7">
+            <a:extLst>
+              <a:ext uri="{FF2B5EF4-FFF2-40B4-BE49-F238E27FC236}">
+                <a16:creationId xmlns:a16="http://schemas.microsoft.com/office/drawing/2014/main" id="{DDD02899-178B-57B4-51DB-E3E6A4DBE653}"/>
+              </a:ext>
+            </a:extLst>
+          </p:cNvPr>
+          <p:cNvSpPr txBox="1"/>
+          <p:nvPr/>
+        </p:nvSpPr>
+        <p:spPr>
+          <a:xfrm>
+            <a:off x="8113276" y="5098148"/>
+            <a:ext cx="503664" cy="261610"/>
+          </a:xfrm>
+          <a:prstGeom prst="rect">
+            <a:avLst/>
+          </a:prstGeom>
+          <a:noFill/>
+        </p:spPr>
+        <p:txBody>
+          <a:bodyPr wrap="none" rtlCol="0">
+            <a:spAutoFit/>
+          </a:bodyPr>
+          <a:lstStyle/>
+          <a:p>
+            <a:r>
+              <a:rPr lang="en-US" sz="1100" i="1" dirty="0"/>
+              <a:t>z-stat</a:t>
             </a:r>
           </a:p>
         </p:txBody>
@@ -3747,58 +3992,22 @@
           <a:chExt cx="0" cy="0"/>
         </a:xfrm>
       </p:grpSpPr>
-      <p:pic>
-        <p:nvPicPr>
-          <p:cNvPr id="5" name="Picture 4" descr="A red line with black dots&#10;&#10;Description automatically generated with low confidence">
-            <a:extLst>
-              <a:ext uri="{FF2B5EF4-FFF2-40B4-BE49-F238E27FC236}">
-                <a16:creationId xmlns:a16="http://schemas.microsoft.com/office/drawing/2014/main" id="{5497A580-F099-73A9-0BE7-6DF46C03D487}"/>
-              </a:ext>
-            </a:extLst>
-          </p:cNvPr>
-          <p:cNvPicPr>
-            <a:picLocks noChangeAspect="1"/>
-          </p:cNvPicPr>
+      <p:sp>
+        <p:nvSpPr>
+          <p:cNvPr id="6" name="TextBox 5">
+            <a:extLst>
+              <a:ext uri="{FF2B5EF4-FFF2-40B4-BE49-F238E27FC236}">
+                <a16:creationId xmlns:a16="http://schemas.microsoft.com/office/drawing/2014/main" id="{D30B8FFD-2B17-E19B-120E-B749BAC03A39}"/>
+              </a:ext>
+            </a:extLst>
+          </p:cNvPr>
+          <p:cNvSpPr txBox="1"/>
           <p:nvPr/>
-        </p:nvPicPr>
-        <p:blipFill>
-          <a:blip r:embed="rId2">
-            <a:extLst>
-              <a:ext uri="{28A0092B-C50C-407E-A947-70E740481C1C}">
-                <a14:useLocalDpi xmlns:a14="http://schemas.microsoft.com/office/drawing/2010/main" val="0"/>
-              </a:ext>
-            </a:extLst>
-          </a:blip>
-          <a:stretch>
-            <a:fillRect/>
-          </a:stretch>
-        </p:blipFill>
+        </p:nvSpPr>
         <p:spPr>
           <a:xfrm>
-            <a:off x="2334722" y="460087"/>
-            <a:ext cx="7270886" cy="4847257"/>
-          </a:xfrm>
-          <a:prstGeom prst="rect">
-            <a:avLst/>
-          </a:prstGeom>
-        </p:spPr>
-      </p:pic>
-      <p:sp>
-        <p:nvSpPr>
-          <p:cNvPr id="6" name="TextBox 5">
-            <a:extLst>
-              <a:ext uri="{FF2B5EF4-FFF2-40B4-BE49-F238E27FC236}">
-                <a16:creationId xmlns:a16="http://schemas.microsoft.com/office/drawing/2014/main" id="{D30B8FFD-2B17-E19B-120E-B749BAC03A39}"/>
-              </a:ext>
-            </a:extLst>
-          </p:cNvPr>
-          <p:cNvSpPr txBox="1"/>
-          <p:nvPr/>
-        </p:nvSpPr>
-        <p:spPr>
-          <a:xfrm>
-            <a:off x="4607767" y="58723"/>
-            <a:ext cx="2976465" cy="523220"/>
+            <a:off x="2172742" y="0"/>
+            <a:ext cx="7584233" cy="523220"/>
           </a:xfrm>
           <a:prstGeom prst="rect">
             <a:avLst/>
@@ -3817,7 +4026,7 @@
                 <a:latin typeface="Arial" panose="020B0604020202020204" pitchFamily="34" charset="0"/>
                 <a:cs typeface="Arial" panose="020B0604020202020204" pitchFamily="34" charset="0"/>
               </a:rPr>
-              <a:t>Amygdala</a:t>
+              <a:t>Connectivity Predicts Amygdala Decrease</a:t>
             </a:r>
           </a:p>
         </p:txBody>
@@ -3853,6 +4062,120 @@
             <a:r>
               <a:rPr lang="en-US" sz="1600" dirty="0"/>
               <a:t>Caption: Change in amygdala response correlated with change in resting state network connectivity. Greater increases in network connectivity post-treatment minus pre-treatment were significantly correlated with greater reductions in amygdala responses post-treatment minus pre-treatment when controlling for time between assessments, number of phobias, and days of neuro-reinforcement (p &lt; 0.05).</a:t>
+            </a:r>
+          </a:p>
+        </p:txBody>
+      </p:sp>
+      <p:pic>
+        <p:nvPicPr>
+          <p:cNvPr id="4" name="Picture 3" descr="A red line with black dots&#10;&#10;Description automatically generated with low confidence">
+            <a:extLst>
+              <a:ext uri="{FF2B5EF4-FFF2-40B4-BE49-F238E27FC236}">
+                <a16:creationId xmlns:a16="http://schemas.microsoft.com/office/drawing/2014/main" id="{C84CCB4C-F494-0603-8D14-63794C8C600F}"/>
+              </a:ext>
+            </a:extLst>
+          </p:cNvPr>
+          <p:cNvPicPr>
+            <a:picLocks noChangeAspect="1"/>
+          </p:cNvPicPr>
+          <p:nvPr/>
+        </p:nvPicPr>
+        <p:blipFill>
+          <a:blip r:embed="rId2">
+            <a:extLst>
+              <a:ext uri="{28A0092B-C50C-407E-A947-70E740481C1C}">
+                <a14:useLocalDpi xmlns:a14="http://schemas.microsoft.com/office/drawing/2010/main" val="0"/>
+              </a:ext>
+            </a:extLst>
+          </a:blip>
+          <a:stretch>
+            <a:fillRect/>
+          </a:stretch>
+        </p:blipFill>
+        <p:spPr>
+          <a:xfrm>
+            <a:off x="2383047" y="581943"/>
+            <a:ext cx="7163625" cy="4775750"/>
+          </a:xfrm>
+          <a:prstGeom prst="rect">
+            <a:avLst/>
+          </a:prstGeom>
+        </p:spPr>
+      </p:pic>
+      <p:sp>
+        <p:nvSpPr>
+          <p:cNvPr id="8" name="TextBox 7">
+            <a:extLst>
+              <a:ext uri="{FF2B5EF4-FFF2-40B4-BE49-F238E27FC236}">
+                <a16:creationId xmlns:a16="http://schemas.microsoft.com/office/drawing/2014/main" id="{AC4515FF-A7BC-FF12-0184-406DB8D50B0B}"/>
+              </a:ext>
+            </a:extLst>
+          </p:cNvPr>
+          <p:cNvSpPr txBox="1"/>
+          <p:nvPr/>
+        </p:nvSpPr>
+        <p:spPr>
+          <a:xfrm>
+            <a:off x="7206143" y="942669"/>
+            <a:ext cx="877163" cy="338554"/>
+          </a:xfrm>
+          <a:prstGeom prst="rect">
+            <a:avLst/>
+          </a:prstGeom>
+          <a:noFill/>
+        </p:spPr>
+        <p:txBody>
+          <a:bodyPr wrap="none" rtlCol="0">
+            <a:spAutoFit/>
+          </a:bodyPr>
+          <a:lstStyle/>
+          <a:p>
+            <a:r>
+              <a:rPr lang="en-US" sz="1600" i="1" dirty="0"/>
+              <a:t>r </a:t>
+            </a:r>
+            <a:r>
+              <a:rPr lang="en-US" sz="1600" dirty="0"/>
+              <a:t>= -0.21</a:t>
+            </a:r>
+          </a:p>
+        </p:txBody>
+      </p:sp>
+      <p:sp>
+        <p:nvSpPr>
+          <p:cNvPr id="9" name="TextBox 8">
+            <a:extLst>
+              <a:ext uri="{FF2B5EF4-FFF2-40B4-BE49-F238E27FC236}">
+                <a16:creationId xmlns:a16="http://schemas.microsoft.com/office/drawing/2014/main" id="{FACC2D10-7CA6-E085-44AF-C97B30E2C21E}"/>
+              </a:ext>
+            </a:extLst>
+          </p:cNvPr>
+          <p:cNvSpPr txBox="1"/>
+          <p:nvPr/>
+        </p:nvSpPr>
+        <p:spPr>
+          <a:xfrm>
+            <a:off x="7187094" y="1161753"/>
+            <a:ext cx="954107" cy="338554"/>
+          </a:xfrm>
+          <a:prstGeom prst="rect">
+            <a:avLst/>
+          </a:prstGeom>
+          <a:noFill/>
+        </p:spPr>
+        <p:txBody>
+          <a:bodyPr wrap="none" rtlCol="0">
+            <a:spAutoFit/>
+          </a:bodyPr>
+          <a:lstStyle/>
+          <a:p>
+            <a:r>
+              <a:rPr lang="en-US" sz="1600" i="1" dirty="0"/>
+              <a:t>p </a:t>
+            </a:r>
+            <a:r>
+              <a:rPr lang="en-US" sz="1600" dirty="0"/>
+              <a:t>= 0.032</a:t>
             </a:r>
           </a:p>
         </p:txBody>
@@ -4163,4 +4486,299 @@
     </a:ext>
   </a:extLst>
 </a:theme>
+</file>
+
+<file path=ppt/theme/theme2.xml><?xml version="1.0" encoding="utf-8"?>
+<a:theme xmlns:a="http://schemas.openxmlformats.org/drawingml/2006/main" name="Office Theme">
+  <a:themeElements>
+    <a:clrScheme name="Office">
+      <a:dk1>
+        <a:sysClr val="windowText" lastClr="000000"/>
+      </a:dk1>
+      <a:lt1>
+        <a:sysClr val="window" lastClr="FFFFFF"/>
+      </a:lt1>
+      <a:dk2>
+        <a:srgbClr val="44546A"/>
+      </a:dk2>
+      <a:lt2>
+        <a:srgbClr val="E7E6E6"/>
+      </a:lt2>
+      <a:accent1>
+        <a:srgbClr val="4472C4"/>
+      </a:accent1>
+      <a:accent2>
+        <a:srgbClr val="ED7D31"/>
+      </a:accent2>
+      <a:accent3>
+        <a:srgbClr val="A5A5A5"/>
+      </a:accent3>
+      <a:accent4>
+        <a:srgbClr val="FFC000"/>
+      </a:accent4>
+      <a:accent5>
+        <a:srgbClr val="5B9BD5"/>
+      </a:accent5>
+      <a:accent6>
+        <a:srgbClr val="70AD47"/>
+      </a:accent6>
+      <a:hlink>
+        <a:srgbClr val="0563C1"/>
+      </a:hlink>
+      <a:folHlink>
+        <a:srgbClr val="954F72"/>
+      </a:folHlink>
+    </a:clrScheme>
+    <a:fontScheme name="Office">
+      <a:majorFont>
+        <a:latin typeface="Calibri Light" panose="020F0302020204030204"/>
+        <a:ea typeface=""/>
+        <a:cs typeface=""/>
+        <a:font script="Jpan" typeface="游ゴシック Light"/>
+        <a:font script="Hang" typeface="맑은 고딕"/>
+        <a:font script="Hans" typeface="等线 Light"/>
+        <a:font script="Hant" typeface="新細明體"/>
+        <a:font script="Arab" typeface="Times New Roman"/>
+        <a:font script="Hebr" typeface="Times New Roman"/>
+        <a:font script="Thai" typeface="Angsana New"/>
+        <a:font script="Ethi" typeface="Nyala"/>
+        <a:font script="Beng" typeface="Vrinda"/>
+        <a:font script="Gujr" typeface="Shruti"/>
+        <a:font script="Khmr" typeface="MoolBoran"/>
+        <a:font script="Knda" typeface="Tunga"/>
+        <a:font script="Guru" typeface="Raavi"/>
+        <a:font script="Cans" typeface="Euphemia"/>
+        <a:font script="Cher" typeface="Plantagenet Cherokee"/>
+        <a:font script="Yiii" typeface="Microsoft Yi Baiti"/>
+        <a:font script="Tibt" typeface="Microsoft Himalaya"/>
+        <a:font script="Thaa" typeface="MV Boli"/>
+        <a:font script="Deva" typeface="Mangal"/>
+        <a:font script="Telu" typeface="Gautami"/>
+        <a:font script="Taml" typeface="Latha"/>
+        <a:font script="Syrc" typeface="Estrangelo Edessa"/>
+        <a:font script="Orya" typeface="Kalinga"/>
+        <a:font script="Mlym" typeface="Kartika"/>
+        <a:font script="Laoo" typeface="DokChampa"/>
+        <a:font script="Sinh" typeface="Iskoola Pota"/>
+        <a:font script="Mong" typeface="Mongolian Baiti"/>
+        <a:font script="Viet" typeface="Times New Roman"/>
+        <a:font script="Uigh" typeface="Microsoft Uighur"/>
+        <a:font script="Geor" typeface="Sylfaen"/>
+        <a:font script="Armn" typeface="Arial"/>
+        <a:font script="Bugi" typeface="Leelawadee UI"/>
+        <a:font script="Bopo" typeface="Microsoft JhengHei"/>
+        <a:font script="Java" typeface="Javanese Text"/>
+        <a:font script="Lisu" typeface="Segoe UI"/>
+        <a:font script="Mymr" typeface="Myanmar Text"/>
+        <a:font script="Nkoo" typeface="Ebrima"/>
+        <a:font script="Olck" typeface="Nirmala UI"/>
+        <a:font script="Osma" typeface="Ebrima"/>
+        <a:font script="Phag" typeface="Phagspa"/>
+        <a:font script="Syrn" typeface="Estrangelo Edessa"/>
+        <a:font script="Syrj" typeface="Estrangelo Edessa"/>
+        <a:font script="Syre" typeface="Estrangelo Edessa"/>
+        <a:font script="Sora" typeface="Nirmala UI"/>
+        <a:font script="Tale" typeface="Microsoft Tai Le"/>
+        <a:font script="Talu" typeface="Microsoft New Tai Lue"/>
+        <a:font script="Tfng" typeface="Ebrima"/>
+      </a:majorFont>
+      <a:minorFont>
+        <a:latin typeface="Calibri" panose="020F0502020204030204"/>
+        <a:ea typeface=""/>
+        <a:cs typeface=""/>
+        <a:font script="Jpan" typeface="游ゴシック"/>
+        <a:font script="Hang" typeface="맑은 고딕"/>
+        <a:font script="Hans" typeface="等线"/>
+        <a:font script="Hant" typeface="新細明體"/>
+        <a:font script="Arab" typeface="Arial"/>
+        <a:font script="Hebr" typeface="Arial"/>
+        <a:font script="Thai" typeface="Cordia New"/>
+        <a:font script="Ethi" typeface="Nyala"/>
+        <a:font script="Beng" typeface="Vrinda"/>
+        <a:font script="Gujr" typeface="Shruti"/>
+        <a:font script="Khmr" typeface="DaunPenh"/>
+        <a:font script="Knda" typeface="Tunga"/>
+        <a:font script="Guru" typeface="Raavi"/>
+        <a:font script="Cans" typeface="Euphemia"/>
+        <a:font script="Cher" typeface="Plantagenet Cherokee"/>
+        <a:font script="Yiii" typeface="Microsoft Yi Baiti"/>
+        <a:font script="Tibt" typeface="Microsoft Himalaya"/>
+        <a:font script="Thaa" typeface="MV Boli"/>
+        <a:font script="Deva" typeface="Mangal"/>
+        <a:font script="Telu" typeface="Gautami"/>
+        <a:font script="Taml" typeface="Latha"/>
+        <a:font script="Syrc" typeface="Estrangelo Edessa"/>
+        <a:font script="Orya" typeface="Kalinga"/>
+        <a:font script="Mlym" typeface="Kartika"/>
+        <a:font script="Laoo" typeface="DokChampa"/>
+        <a:font script="Sinh" typeface="Iskoola Pota"/>
+        <a:font script="Mong" typeface="Mongolian Baiti"/>
+        <a:font script="Viet" typeface="Arial"/>
+        <a:font script="Uigh" typeface="Microsoft Uighur"/>
+        <a:font script="Geor" typeface="Sylfaen"/>
+        <a:font script="Armn" typeface="Arial"/>
+        <a:font script="Bugi" typeface="Leelawadee UI"/>
+        <a:font script="Bopo" typeface="Microsoft JhengHei"/>
+        <a:font script="Java" typeface="Javanese Text"/>
+        <a:font script="Lisu" typeface="Segoe UI"/>
+        <a:font script="Mymr" typeface="Myanmar Text"/>
+        <a:font script="Nkoo" typeface="Ebrima"/>
+        <a:font script="Olck" typeface="Nirmala UI"/>
+        <a:font script="Osma" typeface="Ebrima"/>
+        <a:font script="Phag" typeface="Phagspa"/>
+        <a:font script="Syrn" typeface="Estrangelo Edessa"/>
+        <a:font script="Syrj" typeface="Estrangelo Edessa"/>
+        <a:font script="Syre" typeface="Estrangelo Edessa"/>
+        <a:font script="Sora" typeface="Nirmala UI"/>
+        <a:font script="Tale" typeface="Microsoft Tai Le"/>
+        <a:font script="Talu" typeface="Microsoft New Tai Lue"/>
+        <a:font script="Tfng" typeface="Ebrima"/>
+      </a:minorFont>
+    </a:fontScheme>
+    <a:fmtScheme name="Office">
+      <a:fillStyleLst>
+        <a:solidFill>
+          <a:schemeClr val="phClr"/>
+        </a:solidFill>
+        <a:gradFill rotWithShape="1">
+          <a:gsLst>
+            <a:gs pos="0">
+              <a:schemeClr val="phClr">
+                <a:lumMod val="110000"/>
+                <a:satMod val="105000"/>
+                <a:tint val="67000"/>
+              </a:schemeClr>
+            </a:gs>
+            <a:gs pos="50000">
+              <a:schemeClr val="phClr">
+                <a:lumMod val="105000"/>
+                <a:satMod val="103000"/>
+                <a:tint val="73000"/>
+              </a:schemeClr>
+            </a:gs>
+            <a:gs pos="100000">
+              <a:schemeClr val="phClr">
+                <a:lumMod val="105000"/>
+                <a:satMod val="109000"/>
+                <a:tint val="81000"/>
+              </a:schemeClr>
+            </a:gs>
+          </a:gsLst>
+          <a:lin ang="5400000" scaled="0"/>
+        </a:gradFill>
+        <a:gradFill rotWithShape="1">
+          <a:gsLst>
+            <a:gs pos="0">
+              <a:schemeClr val="phClr">
+                <a:satMod val="103000"/>
+                <a:lumMod val="102000"/>
+                <a:tint val="94000"/>
+              </a:schemeClr>
+            </a:gs>
+            <a:gs pos="50000">
+              <a:schemeClr val="phClr">
+                <a:satMod val="110000"/>
+                <a:lumMod val="100000"/>
+                <a:shade val="100000"/>
+              </a:schemeClr>
+            </a:gs>
+            <a:gs pos="100000">
+              <a:schemeClr val="phClr">
+                <a:lumMod val="99000"/>
+                <a:satMod val="120000"/>
+                <a:shade val="78000"/>
+              </a:schemeClr>
+            </a:gs>
+          </a:gsLst>
+          <a:lin ang="5400000" scaled="0"/>
+        </a:gradFill>
+      </a:fillStyleLst>
+      <a:lnStyleLst>
+        <a:ln w="6350" cap="flat" cmpd="sng" algn="ctr">
+          <a:solidFill>
+            <a:schemeClr val="phClr"/>
+          </a:solidFill>
+          <a:prstDash val="solid"/>
+          <a:miter lim="800000"/>
+        </a:ln>
+        <a:ln w="12700" cap="flat" cmpd="sng" algn="ctr">
+          <a:solidFill>
+            <a:schemeClr val="phClr"/>
+          </a:solidFill>
+          <a:prstDash val="solid"/>
+          <a:miter lim="800000"/>
+        </a:ln>
+        <a:ln w="19050" cap="flat" cmpd="sng" algn="ctr">
+          <a:solidFill>
+            <a:schemeClr val="phClr"/>
+          </a:solidFill>
+          <a:prstDash val="solid"/>
+          <a:miter lim="800000"/>
+        </a:ln>
+      </a:lnStyleLst>
+      <a:effectStyleLst>
+        <a:effectStyle>
+          <a:effectLst/>
+        </a:effectStyle>
+        <a:effectStyle>
+          <a:effectLst/>
+        </a:effectStyle>
+        <a:effectStyle>
+          <a:effectLst>
+            <a:outerShdw blurRad="57150" dist="19050" dir="5400000" algn="ctr" rotWithShape="0">
+              <a:srgbClr val="000000">
+                <a:alpha val="63000"/>
+              </a:srgbClr>
+            </a:outerShdw>
+          </a:effectLst>
+        </a:effectStyle>
+      </a:effectStyleLst>
+      <a:bgFillStyleLst>
+        <a:solidFill>
+          <a:schemeClr val="phClr"/>
+        </a:solidFill>
+        <a:solidFill>
+          <a:schemeClr val="phClr">
+            <a:tint val="95000"/>
+            <a:satMod val="170000"/>
+          </a:schemeClr>
+        </a:solidFill>
+        <a:gradFill rotWithShape="1">
+          <a:gsLst>
+            <a:gs pos="0">
+              <a:schemeClr val="phClr">
+                <a:tint val="93000"/>
+                <a:satMod val="150000"/>
+                <a:shade val="98000"/>
+                <a:lumMod val="102000"/>
+              </a:schemeClr>
+            </a:gs>
+            <a:gs pos="50000">
+              <a:schemeClr val="phClr">
+                <a:tint val="98000"/>
+                <a:satMod val="130000"/>
+                <a:shade val="90000"/>
+                <a:lumMod val="103000"/>
+              </a:schemeClr>
+            </a:gs>
+            <a:gs pos="100000">
+              <a:schemeClr val="phClr">
+                <a:shade val="63000"/>
+                <a:satMod val="120000"/>
+              </a:schemeClr>
+            </a:gs>
+          </a:gsLst>
+          <a:lin ang="5400000" scaled="0"/>
+        </a:gradFill>
+      </a:bgFillStyleLst>
+    </a:fmtScheme>
+  </a:themeElements>
+  <a:objectDefaults/>
+  <a:extraClrSchemeLst/>
+  <a:extLst>
+    <a:ext uri="{05A4C25C-085E-4340-85A3-A5531E510DB2}">
+      <thm15:themeFamily xmlns:thm15="http://schemas.microsoft.com/office/thememl/2012/main" name="Office Theme" id="{62F939B6-93AF-4DB8-9C6B-D6C7DFDC589F}" vid="{4A3C46E8-61CC-4603-A589-7422A47A8E4A}"/>
+    </a:ext>
+  </a:extLst>
+</a:theme>
 </file>
</xml_diff>

<commit_message>
created post network pic
</commit_message>
<xml_diff>
--- a/restingstate_figures.pptx
+++ b/restingstate_figures.pptx
@@ -5,11 +5,12 @@
     <p:sldMasterId id="2147483648" r:id="rId1"/>
   </p:sldMasterIdLst>
   <p:notesMasterIdLst>
-    <p:notesMasterId r:id="rId4"/>
+    <p:notesMasterId r:id="rId5"/>
   </p:notesMasterIdLst>
   <p:sldIdLst>
     <p:sldId id="257" r:id="rId2"/>
-    <p:sldId id="258" r:id="rId3"/>
+    <p:sldId id="259" r:id="rId3"/>
+    <p:sldId id="258" r:id="rId4"/>
   </p:sldIdLst>
   <p:sldSz cx="12192000" cy="6858000"/>
   <p:notesSz cx="6858000" cy="9144000"/>
@@ -3800,8 +3801,8 @@
         </p:nvSpPr>
         <p:spPr>
           <a:xfrm>
-            <a:off x="7374403" y="4360636"/>
-            <a:ext cx="3808123" cy="261610"/>
+            <a:off x="7374404" y="4360636"/>
+            <a:ext cx="2143016" cy="261610"/>
           </a:xfrm>
           <a:prstGeom prst="rect">
             <a:avLst/>
@@ -3976,6 +3977,213 @@
 </file>
 
 <file path=ppt/slides/slide2.xml><?xml version="1.0" encoding="utf-8"?>
+<p:sld xmlns:a="http://schemas.openxmlformats.org/drawingml/2006/main" xmlns:r="http://schemas.openxmlformats.org/officeDocument/2006/relationships" xmlns:p="http://schemas.openxmlformats.org/presentationml/2006/main">
+  <p:cSld>
+    <p:spTree>
+      <p:nvGrpSpPr>
+        <p:cNvPr id="1" name=""/>
+        <p:cNvGrpSpPr/>
+        <p:nvPr/>
+      </p:nvGrpSpPr>
+      <p:grpSpPr>
+        <a:xfrm>
+          <a:off x="0" y="0"/>
+          <a:ext cx="0" cy="0"/>
+          <a:chOff x="0" y="0"/>
+          <a:chExt cx="0" cy="0"/>
+        </a:xfrm>
+      </p:grpSpPr>
+      <p:sp>
+        <p:nvSpPr>
+          <p:cNvPr id="4" name="TextBox 3">
+            <a:extLst>
+              <a:ext uri="{FF2B5EF4-FFF2-40B4-BE49-F238E27FC236}">
+                <a16:creationId xmlns:a16="http://schemas.microsoft.com/office/drawing/2014/main" id="{0FB4CAD2-A1AE-CCAB-3A0C-C2B027DD19C5}"/>
+              </a:ext>
+            </a:extLst>
+          </p:cNvPr>
+          <p:cNvSpPr txBox="1"/>
+          <p:nvPr/>
+        </p:nvSpPr>
+        <p:spPr>
+          <a:xfrm>
+            <a:off x="2975764" y="5650469"/>
+            <a:ext cx="6558201" cy="369332"/>
+          </a:xfrm>
+          <a:prstGeom prst="rect">
+            <a:avLst/>
+          </a:prstGeom>
+          <a:noFill/>
+        </p:spPr>
+        <p:txBody>
+          <a:bodyPr wrap="square" rtlCol="0">
+            <a:spAutoFit/>
+          </a:bodyPr>
+          <a:lstStyle/>
+          <a:p>
+            <a:r>
+              <a:rPr lang="en-US" dirty="0"/>
+              <a:t>Caption: Maps of resting state network activation at post-treatment.</a:t>
+            </a:r>
+          </a:p>
+        </p:txBody>
+      </p:sp>
+      <p:pic>
+        <p:nvPicPr>
+          <p:cNvPr id="6" name="Picture 5" descr="A brain with blue spots&#10;&#10;Description automatically generated">
+            <a:extLst>
+              <a:ext uri="{FF2B5EF4-FFF2-40B4-BE49-F238E27FC236}">
+                <a16:creationId xmlns:a16="http://schemas.microsoft.com/office/drawing/2014/main" id="{8139AF91-3BEA-169C-6EAD-A23E678241F0}"/>
+              </a:ext>
+            </a:extLst>
+          </p:cNvPr>
+          <p:cNvPicPr>
+            <a:picLocks noChangeAspect="1"/>
+          </p:cNvPicPr>
+          <p:nvPr/>
+        </p:nvPicPr>
+        <p:blipFill>
+          <a:blip r:embed="rId2">
+            <a:extLst>
+              <a:ext uri="{28A0092B-C50C-407E-A947-70E740481C1C}">
+                <a14:useLocalDpi xmlns:a14="http://schemas.microsoft.com/office/drawing/2010/main" val="0"/>
+              </a:ext>
+            </a:extLst>
+          </a:blip>
+          <a:stretch>
+            <a:fillRect/>
+          </a:stretch>
+        </p:blipFill>
+        <p:spPr>
+          <a:xfrm>
+            <a:off x="4034304" y="1107140"/>
+            <a:ext cx="4123392" cy="4123392"/>
+          </a:xfrm>
+          <a:prstGeom prst="rect">
+            <a:avLst/>
+          </a:prstGeom>
+        </p:spPr>
+      </p:pic>
+      <p:pic>
+        <p:nvPicPr>
+          <p:cNvPr id="7" name="Picture 6">
+            <a:extLst>
+              <a:ext uri="{FF2B5EF4-FFF2-40B4-BE49-F238E27FC236}">
+                <a16:creationId xmlns:a16="http://schemas.microsoft.com/office/drawing/2014/main" id="{D2A65860-64AB-3A17-EF47-C8187CD35108}"/>
+              </a:ext>
+            </a:extLst>
+          </p:cNvPr>
+          <p:cNvPicPr>
+            <a:picLocks noChangeAspect="1"/>
+          </p:cNvPicPr>
+          <p:nvPr/>
+        </p:nvPicPr>
+        <p:blipFill>
+          <a:blip r:embed="rId3">
+            <a:extLst>
+              <a:ext uri="{28A0092B-C50C-407E-A947-70E740481C1C}">
+                <a14:useLocalDpi xmlns:a14="http://schemas.microsoft.com/office/drawing/2010/main" val="0"/>
+              </a:ext>
+            </a:extLst>
+          </a:blip>
+          <a:stretch>
+            <a:fillRect/>
+          </a:stretch>
+        </p:blipFill>
+        <p:spPr>
+          <a:xfrm>
+            <a:off x="7620029" y="4597974"/>
+            <a:ext cx="1866824" cy="75174"/>
+          </a:xfrm>
+          <a:prstGeom prst="rect">
+            <a:avLst/>
+          </a:prstGeom>
+        </p:spPr>
+      </p:pic>
+      <p:sp>
+        <p:nvSpPr>
+          <p:cNvPr id="8" name="TextBox 7">
+            <a:extLst>
+              <a:ext uri="{FF2B5EF4-FFF2-40B4-BE49-F238E27FC236}">
+                <a16:creationId xmlns:a16="http://schemas.microsoft.com/office/drawing/2014/main" id="{3E2D15C5-1C4B-9C6E-BC63-AADA76C932CC}"/>
+              </a:ext>
+            </a:extLst>
+          </p:cNvPr>
+          <p:cNvSpPr txBox="1"/>
+          <p:nvPr/>
+        </p:nvSpPr>
+        <p:spPr>
+          <a:xfrm>
+            <a:off x="7522322" y="4629578"/>
+            <a:ext cx="2143016" cy="261610"/>
+          </a:xfrm>
+          <a:prstGeom prst="rect">
+            <a:avLst/>
+          </a:prstGeom>
+          <a:noFill/>
+        </p:spPr>
+        <p:txBody>
+          <a:bodyPr wrap="square" rtlCol="0">
+            <a:spAutoFit/>
+          </a:bodyPr>
+          <a:lstStyle/>
+          <a:p>
+            <a:r>
+              <a:rPr lang="en-US" sz="1100" dirty="0"/>
+              <a:t>0                      6.25                   12.5</a:t>
+            </a:r>
+          </a:p>
+        </p:txBody>
+      </p:sp>
+      <p:sp>
+        <p:nvSpPr>
+          <p:cNvPr id="9" name="TextBox 8">
+            <a:extLst>
+              <a:ext uri="{FF2B5EF4-FFF2-40B4-BE49-F238E27FC236}">
+                <a16:creationId xmlns:a16="http://schemas.microsoft.com/office/drawing/2014/main" id="{4F467DD4-84C8-8438-DECF-05F8B9605521}"/>
+              </a:ext>
+            </a:extLst>
+          </p:cNvPr>
+          <p:cNvSpPr txBox="1"/>
+          <p:nvPr/>
+        </p:nvSpPr>
+        <p:spPr>
+          <a:xfrm>
+            <a:off x="8254441" y="4833750"/>
+            <a:ext cx="503664" cy="261610"/>
+          </a:xfrm>
+          <a:prstGeom prst="rect">
+            <a:avLst/>
+          </a:prstGeom>
+          <a:noFill/>
+        </p:spPr>
+        <p:txBody>
+          <a:bodyPr wrap="none" rtlCol="0">
+            <a:spAutoFit/>
+          </a:bodyPr>
+          <a:lstStyle/>
+          <a:p>
+            <a:r>
+              <a:rPr lang="en-US" sz="1100" i="1" dirty="0"/>
+              <a:t>z-stat</a:t>
+            </a:r>
+          </a:p>
+        </p:txBody>
+      </p:sp>
+    </p:spTree>
+    <p:extLst>
+      <p:ext uri="{BB962C8B-B14F-4D97-AF65-F5344CB8AC3E}">
+        <p14:creationId xmlns:p14="http://schemas.microsoft.com/office/powerpoint/2010/main" val="3473762620"/>
+      </p:ext>
+    </p:extLst>
+  </p:cSld>
+  <p:clrMapOvr>
+    <a:masterClrMapping/>
+  </p:clrMapOvr>
+</p:sld>
+</file>
+
+<file path=ppt/slides/slide3.xml><?xml version="1.0" encoding="utf-8"?>
 <p:sld xmlns:a="http://schemas.openxmlformats.org/drawingml/2006/main" xmlns:r="http://schemas.openxmlformats.org/officeDocument/2006/relationships" xmlns:p="http://schemas.openxmlformats.org/presentationml/2006/main">
   <p:cSld>
     <p:spTree>

</xml_diff>

<commit_message>
tidied up figures, got r2 for control animal
</commit_message>
<xml_diff>
--- a/restingstate_figures.pptx
+++ b/restingstate_figures.pptx
@@ -199,7 +199,7 @@
           <a:p>
             <a:fld id="{6A55DAFD-ECC9-4E86-9372-AA175A96D8F5}" type="datetimeFigureOut">
               <a:rPr lang="en-US" smtClean="0"/>
-              <a:t>9/26/23</a:t>
+              <a:t>10/5/2023</a:t>
             </a:fld>
             <a:endParaRPr lang="en-US"/>
           </a:p>
@@ -613,7 +613,7 @@
           <a:p>
             <a:fld id="{D361DC46-4C98-4A65-A426-E76E09BB01EE}" type="datetimeFigureOut">
               <a:rPr lang="en-US" smtClean="0"/>
-              <a:t>9/26/23</a:t>
+              <a:t>10/5/2023</a:t>
             </a:fld>
             <a:endParaRPr lang="en-US"/>
           </a:p>
@@ -811,7 +811,7 @@
           <a:p>
             <a:fld id="{D361DC46-4C98-4A65-A426-E76E09BB01EE}" type="datetimeFigureOut">
               <a:rPr lang="en-US" smtClean="0"/>
-              <a:t>9/26/23</a:t>
+              <a:t>10/5/2023</a:t>
             </a:fld>
             <a:endParaRPr lang="en-US"/>
           </a:p>
@@ -1019,7 +1019,7 @@
           <a:p>
             <a:fld id="{D361DC46-4C98-4A65-A426-E76E09BB01EE}" type="datetimeFigureOut">
               <a:rPr lang="en-US" smtClean="0"/>
-              <a:t>9/26/23</a:t>
+              <a:t>10/5/2023</a:t>
             </a:fld>
             <a:endParaRPr lang="en-US"/>
           </a:p>
@@ -1217,7 +1217,7 @@
           <a:p>
             <a:fld id="{D361DC46-4C98-4A65-A426-E76E09BB01EE}" type="datetimeFigureOut">
               <a:rPr lang="en-US" smtClean="0"/>
-              <a:t>9/26/23</a:t>
+              <a:t>10/5/2023</a:t>
             </a:fld>
             <a:endParaRPr lang="en-US"/>
           </a:p>
@@ -1492,7 +1492,7 @@
           <a:p>
             <a:fld id="{D361DC46-4C98-4A65-A426-E76E09BB01EE}" type="datetimeFigureOut">
               <a:rPr lang="en-US" smtClean="0"/>
-              <a:t>9/26/23</a:t>
+              <a:t>10/5/2023</a:t>
             </a:fld>
             <a:endParaRPr lang="en-US"/>
           </a:p>
@@ -1757,7 +1757,7 @@
           <a:p>
             <a:fld id="{D361DC46-4C98-4A65-A426-E76E09BB01EE}" type="datetimeFigureOut">
               <a:rPr lang="en-US" smtClean="0"/>
-              <a:t>9/26/23</a:t>
+              <a:t>10/5/2023</a:t>
             </a:fld>
             <a:endParaRPr lang="en-US"/>
           </a:p>
@@ -2169,7 +2169,7 @@
           <a:p>
             <a:fld id="{D361DC46-4C98-4A65-A426-E76E09BB01EE}" type="datetimeFigureOut">
               <a:rPr lang="en-US" smtClean="0"/>
-              <a:t>9/26/23</a:t>
+              <a:t>10/5/2023</a:t>
             </a:fld>
             <a:endParaRPr lang="en-US"/>
           </a:p>
@@ -2310,7 +2310,7 @@
           <a:p>
             <a:fld id="{D361DC46-4C98-4A65-A426-E76E09BB01EE}" type="datetimeFigureOut">
               <a:rPr lang="en-US" smtClean="0"/>
-              <a:t>9/26/23</a:t>
+              <a:t>10/5/2023</a:t>
             </a:fld>
             <a:endParaRPr lang="en-US"/>
           </a:p>
@@ -2423,7 +2423,7 @@
           <a:p>
             <a:fld id="{D361DC46-4C98-4A65-A426-E76E09BB01EE}" type="datetimeFigureOut">
               <a:rPr lang="en-US" smtClean="0"/>
-              <a:t>9/26/23</a:t>
+              <a:t>10/5/2023</a:t>
             </a:fld>
             <a:endParaRPr lang="en-US"/>
           </a:p>
@@ -2734,7 +2734,7 @@
           <a:p>
             <a:fld id="{D361DC46-4C98-4A65-A426-E76E09BB01EE}" type="datetimeFigureOut">
               <a:rPr lang="en-US" smtClean="0"/>
-              <a:t>9/26/23</a:t>
+              <a:t>10/5/2023</a:t>
             </a:fld>
             <a:endParaRPr lang="en-US"/>
           </a:p>
@@ -3022,7 +3022,7 @@
           <a:p>
             <a:fld id="{D361DC46-4C98-4A65-A426-E76E09BB01EE}" type="datetimeFigureOut">
               <a:rPr lang="en-US" smtClean="0"/>
-              <a:t>9/26/23</a:t>
+              <a:t>10/5/2023</a:t>
             </a:fld>
             <a:endParaRPr lang="en-US"/>
           </a:p>
@@ -3263,7 +3263,7 @@
           <a:p>
             <a:fld id="{D361DC46-4C98-4A65-A426-E76E09BB01EE}" type="datetimeFigureOut">
               <a:rPr lang="en-US" smtClean="0"/>
-              <a:t>9/26/23</a:t>
+              <a:t>10/5/2023</a:t>
             </a:fld>
             <a:endParaRPr lang="en-US"/>
           </a:p>
@@ -4421,84 +4421,6 @@
             <a:r>
               <a:rPr lang="en-US" sz="1600" dirty="0"/>
               <a:t>Caption: Change in amygdala response correlated with change in resting state network connectivity. Greater increases in network connectivity post-treatment minus pre-treatment were significantly correlated with greater reductions in amygdala responses post-treatment minus pre-treatment when controlling for time between assessments, number of phobias, and days of neuro-reinforcement (p &lt; 0.05).</a:t>
-            </a:r>
-          </a:p>
-        </p:txBody>
-      </p:sp>
-      <p:sp>
-        <p:nvSpPr>
-          <p:cNvPr id="8" name="TextBox 7">
-            <a:extLst>
-              <a:ext uri="{FF2B5EF4-FFF2-40B4-BE49-F238E27FC236}">
-                <a16:creationId xmlns:a16="http://schemas.microsoft.com/office/drawing/2014/main" id="{AC4515FF-A7BC-FF12-0184-406DB8D50B0B}"/>
-              </a:ext>
-            </a:extLst>
-          </p:cNvPr>
-          <p:cNvSpPr txBox="1"/>
-          <p:nvPr/>
-        </p:nvSpPr>
-        <p:spPr>
-          <a:xfrm>
-            <a:off x="7821196" y="993278"/>
-            <a:ext cx="877163" cy="338554"/>
-          </a:xfrm>
-          <a:prstGeom prst="rect">
-            <a:avLst/>
-          </a:prstGeom>
-          <a:noFill/>
-        </p:spPr>
-        <p:txBody>
-          <a:bodyPr wrap="none" rtlCol="0">
-            <a:spAutoFit/>
-          </a:bodyPr>
-          <a:lstStyle/>
-          <a:p>
-            <a:r>
-              <a:rPr lang="en-US" sz="1600" i="1" dirty="0"/>
-              <a:t>r </a:t>
-            </a:r>
-            <a:r>
-              <a:rPr lang="en-US" sz="1600" dirty="0"/>
-              <a:t>= -0.24</a:t>
-            </a:r>
-          </a:p>
-        </p:txBody>
-      </p:sp>
-      <p:sp>
-        <p:nvSpPr>
-          <p:cNvPr id="9" name="TextBox 8">
-            <a:extLst>
-              <a:ext uri="{FF2B5EF4-FFF2-40B4-BE49-F238E27FC236}">
-                <a16:creationId xmlns:a16="http://schemas.microsoft.com/office/drawing/2014/main" id="{FACC2D10-7CA6-E085-44AF-C97B30E2C21E}"/>
-              </a:ext>
-            </a:extLst>
-          </p:cNvPr>
-          <p:cNvSpPr txBox="1"/>
-          <p:nvPr/>
-        </p:nvSpPr>
-        <p:spPr>
-          <a:xfrm>
-            <a:off x="7802147" y="1212362"/>
-            <a:ext cx="849913" cy="338554"/>
-          </a:xfrm>
-          <a:prstGeom prst="rect">
-            <a:avLst/>
-          </a:prstGeom>
-          <a:noFill/>
-        </p:spPr>
-        <p:txBody>
-          <a:bodyPr wrap="none" rtlCol="0">
-            <a:spAutoFit/>
-          </a:bodyPr>
-          <a:lstStyle/>
-          <a:p>
-            <a:r>
-              <a:rPr lang="en-US" sz="1600" i="1" dirty="0"/>
-              <a:t>p </a:t>
-            </a:r>
-            <a:r>
-              <a:rPr lang="en-US" sz="1600" dirty="0"/>
-              <a:t>= .021</a:t>
             </a:r>
           </a:p>
         </p:txBody>

</xml_diff>

<commit_message>
figures were cut off
</commit_message>
<xml_diff>
--- a/restingstate_figures.pptx
+++ b/restingstate_figures.pptx
@@ -5,12 +5,13 @@
     <p:sldMasterId id="2147483648" r:id="rId1"/>
   </p:sldMasterIdLst>
   <p:notesMasterIdLst>
-    <p:notesMasterId r:id="rId5"/>
+    <p:notesMasterId r:id="rId6"/>
   </p:notesMasterIdLst>
   <p:sldIdLst>
     <p:sldId id="257" r:id="rId2"/>
     <p:sldId id="259" r:id="rId3"/>
     <p:sldId id="258" r:id="rId4"/>
+    <p:sldId id="260" r:id="rId5"/>
   </p:sldIdLst>
   <p:sldSz cx="12192000" cy="6858000"/>
   <p:notesSz cx="6858000" cy="9144000"/>
@@ -199,7 +200,7 @@
           <a:p>
             <a:fld id="{6A55DAFD-ECC9-4E86-9372-AA175A96D8F5}" type="datetimeFigureOut">
               <a:rPr lang="en-US" smtClean="0"/>
-              <a:t>10/5/2023</a:t>
+              <a:t>10/24/23</a:t>
             </a:fld>
             <a:endParaRPr lang="en-US"/>
           </a:p>
@@ -613,7 +614,7 @@
           <a:p>
             <a:fld id="{D361DC46-4C98-4A65-A426-E76E09BB01EE}" type="datetimeFigureOut">
               <a:rPr lang="en-US" smtClean="0"/>
-              <a:t>10/5/2023</a:t>
+              <a:t>10/24/23</a:t>
             </a:fld>
             <a:endParaRPr lang="en-US"/>
           </a:p>
@@ -811,7 +812,7 @@
           <a:p>
             <a:fld id="{D361DC46-4C98-4A65-A426-E76E09BB01EE}" type="datetimeFigureOut">
               <a:rPr lang="en-US" smtClean="0"/>
-              <a:t>10/5/2023</a:t>
+              <a:t>10/24/23</a:t>
             </a:fld>
             <a:endParaRPr lang="en-US"/>
           </a:p>
@@ -1019,7 +1020,7 @@
           <a:p>
             <a:fld id="{D361DC46-4C98-4A65-A426-E76E09BB01EE}" type="datetimeFigureOut">
               <a:rPr lang="en-US" smtClean="0"/>
-              <a:t>10/5/2023</a:t>
+              <a:t>10/24/23</a:t>
             </a:fld>
             <a:endParaRPr lang="en-US"/>
           </a:p>
@@ -1217,7 +1218,7 @@
           <a:p>
             <a:fld id="{D361DC46-4C98-4A65-A426-E76E09BB01EE}" type="datetimeFigureOut">
               <a:rPr lang="en-US" smtClean="0"/>
-              <a:t>10/5/2023</a:t>
+              <a:t>10/24/23</a:t>
             </a:fld>
             <a:endParaRPr lang="en-US"/>
           </a:p>
@@ -1492,7 +1493,7 @@
           <a:p>
             <a:fld id="{D361DC46-4C98-4A65-A426-E76E09BB01EE}" type="datetimeFigureOut">
               <a:rPr lang="en-US" smtClean="0"/>
-              <a:t>10/5/2023</a:t>
+              <a:t>10/24/23</a:t>
             </a:fld>
             <a:endParaRPr lang="en-US"/>
           </a:p>
@@ -1757,7 +1758,7 @@
           <a:p>
             <a:fld id="{D361DC46-4C98-4A65-A426-E76E09BB01EE}" type="datetimeFigureOut">
               <a:rPr lang="en-US" smtClean="0"/>
-              <a:t>10/5/2023</a:t>
+              <a:t>10/24/23</a:t>
             </a:fld>
             <a:endParaRPr lang="en-US"/>
           </a:p>
@@ -2169,7 +2170,7 @@
           <a:p>
             <a:fld id="{D361DC46-4C98-4A65-A426-E76E09BB01EE}" type="datetimeFigureOut">
               <a:rPr lang="en-US" smtClean="0"/>
-              <a:t>10/5/2023</a:t>
+              <a:t>10/24/23</a:t>
             </a:fld>
             <a:endParaRPr lang="en-US"/>
           </a:p>
@@ -2310,7 +2311,7 @@
           <a:p>
             <a:fld id="{D361DC46-4C98-4A65-A426-E76E09BB01EE}" type="datetimeFigureOut">
               <a:rPr lang="en-US" smtClean="0"/>
-              <a:t>10/5/2023</a:t>
+              <a:t>10/24/23</a:t>
             </a:fld>
             <a:endParaRPr lang="en-US"/>
           </a:p>
@@ -2423,7 +2424,7 @@
           <a:p>
             <a:fld id="{D361DC46-4C98-4A65-A426-E76E09BB01EE}" type="datetimeFigureOut">
               <a:rPr lang="en-US" smtClean="0"/>
-              <a:t>10/5/2023</a:t>
+              <a:t>10/24/23</a:t>
             </a:fld>
             <a:endParaRPr lang="en-US"/>
           </a:p>
@@ -2734,7 +2735,7 @@
           <a:p>
             <a:fld id="{D361DC46-4C98-4A65-A426-E76E09BB01EE}" type="datetimeFigureOut">
               <a:rPr lang="en-US" smtClean="0"/>
-              <a:t>10/5/2023</a:t>
+              <a:t>10/24/23</a:t>
             </a:fld>
             <a:endParaRPr lang="en-US"/>
           </a:p>
@@ -3022,7 +3023,7 @@
           <a:p>
             <a:fld id="{D361DC46-4C98-4A65-A426-E76E09BB01EE}" type="datetimeFigureOut">
               <a:rPr lang="en-US" smtClean="0"/>
-              <a:t>10/5/2023</a:t>
+              <a:t>10/24/23</a:t>
             </a:fld>
             <a:endParaRPr lang="en-US"/>
           </a:p>
@@ -3263,7 +3264,7 @@
           <a:p>
             <a:fld id="{D361DC46-4C98-4A65-A426-E76E09BB01EE}" type="datetimeFigureOut">
               <a:rPr lang="en-US" smtClean="0"/>
-              <a:t>10/5/2023</a:t>
+              <a:t>10/24/23</a:t>
             </a:fld>
             <a:endParaRPr lang="en-US"/>
           </a:p>
@@ -4429,6 +4430,108 @@
     <p:extLst>
       <p:ext uri="{BB962C8B-B14F-4D97-AF65-F5344CB8AC3E}">
         <p14:creationId xmlns:p14="http://schemas.microsoft.com/office/powerpoint/2010/main" val="1925184178"/>
+      </p:ext>
+    </p:extLst>
+  </p:cSld>
+  <p:clrMapOvr>
+    <a:masterClrMapping/>
+  </p:clrMapOvr>
+</p:sld>
+</file>
+
+<file path=ppt/slides/slide4.xml><?xml version="1.0" encoding="utf-8"?>
+<p:sld xmlns:a="http://schemas.openxmlformats.org/drawingml/2006/main" xmlns:r="http://schemas.openxmlformats.org/officeDocument/2006/relationships" xmlns:p="http://schemas.openxmlformats.org/presentationml/2006/main">
+  <p:cSld>
+    <p:spTree>
+      <p:nvGrpSpPr>
+        <p:cNvPr id="1" name=""/>
+        <p:cNvGrpSpPr/>
+        <p:nvPr/>
+      </p:nvGrpSpPr>
+      <p:grpSpPr>
+        <a:xfrm>
+          <a:off x="0" y="0"/>
+          <a:ext cx="0" cy="0"/>
+          <a:chOff x="0" y="0"/>
+          <a:chExt cx="0" cy="0"/>
+        </a:xfrm>
+      </p:grpSpPr>
+      <p:pic>
+        <p:nvPicPr>
+          <p:cNvPr id="3" name="Picture 2" descr="A red line with black dots&#10;&#10;Description automatically generated">
+            <a:extLst>
+              <a:ext uri="{FF2B5EF4-FFF2-40B4-BE49-F238E27FC236}">
+                <a16:creationId xmlns:a16="http://schemas.microsoft.com/office/drawing/2014/main" id="{0C318DEB-A384-A57B-C5BC-1B5DD1FB6F38}"/>
+              </a:ext>
+            </a:extLst>
+          </p:cNvPr>
+          <p:cNvPicPr>
+            <a:picLocks noChangeAspect="1"/>
+          </p:cNvPicPr>
+          <p:nvPr/>
+        </p:nvPicPr>
+        <p:blipFill>
+          <a:blip r:embed="rId2">
+            <a:extLst>
+              <a:ext uri="{28A0092B-C50C-407E-A947-70E740481C1C}">
+                <a14:useLocalDpi xmlns:a14="http://schemas.microsoft.com/office/drawing/2010/main" val="0"/>
+              </a:ext>
+            </a:extLst>
+          </a:blip>
+          <a:stretch>
+            <a:fillRect/>
+          </a:stretch>
+        </p:blipFill>
+        <p:spPr>
+          <a:xfrm>
+            <a:off x="1047503" y="1496291"/>
+            <a:ext cx="4595751" cy="3063834"/>
+          </a:xfrm>
+          <a:prstGeom prst="rect">
+            <a:avLst/>
+          </a:prstGeom>
+        </p:spPr>
+      </p:pic>
+      <p:pic>
+        <p:nvPicPr>
+          <p:cNvPr id="5" name="Picture 4" descr="A graph with a red line and black dots&#10;&#10;Description automatically generated">
+            <a:extLst>
+              <a:ext uri="{FF2B5EF4-FFF2-40B4-BE49-F238E27FC236}">
+                <a16:creationId xmlns:a16="http://schemas.microsoft.com/office/drawing/2014/main" id="{C094755C-9A7C-3D42-A056-E221A924AC4C}"/>
+              </a:ext>
+            </a:extLst>
+          </p:cNvPr>
+          <p:cNvPicPr>
+            <a:picLocks noChangeAspect="1"/>
+          </p:cNvPicPr>
+          <p:nvPr/>
+        </p:nvPicPr>
+        <p:blipFill>
+          <a:blip r:embed="rId3">
+            <a:extLst>
+              <a:ext uri="{28A0092B-C50C-407E-A947-70E740481C1C}">
+                <a14:useLocalDpi xmlns:a14="http://schemas.microsoft.com/office/drawing/2010/main" val="0"/>
+              </a:ext>
+            </a:extLst>
+          </a:blip>
+          <a:stretch>
+            <a:fillRect/>
+          </a:stretch>
+        </p:blipFill>
+        <p:spPr>
+          <a:xfrm>
+            <a:off x="7040088" y="1496291"/>
+            <a:ext cx="4595751" cy="3063834"/>
+          </a:xfrm>
+          <a:prstGeom prst="rect">
+            <a:avLst/>
+          </a:prstGeom>
+        </p:spPr>
+      </p:pic>
+    </p:spTree>
+    <p:extLst>
+      <p:ext uri="{BB962C8B-B14F-4D97-AF65-F5344CB8AC3E}">
+        <p14:creationId xmlns:p14="http://schemas.microsoft.com/office/powerpoint/2010/main" val="3448475449"/>
       </p:ext>
     </p:extLst>
   </p:cSld>

</xml_diff>

<commit_message>
added titles to the figures
</commit_message>
<xml_diff>
--- a/restingstate_figures.pptx
+++ b/restingstate_figures.pptx
@@ -200,7 +200,7 @@
           <a:p>
             <a:fld id="{6A55DAFD-ECC9-4E86-9372-AA175A96D8F5}" type="datetimeFigureOut">
               <a:rPr lang="en-US" smtClean="0"/>
-              <a:t>10/24/23</a:t>
+              <a:t>10/26/2023</a:t>
             </a:fld>
             <a:endParaRPr lang="en-US"/>
           </a:p>
@@ -614,7 +614,7 @@
           <a:p>
             <a:fld id="{D361DC46-4C98-4A65-A426-E76E09BB01EE}" type="datetimeFigureOut">
               <a:rPr lang="en-US" smtClean="0"/>
-              <a:t>10/24/23</a:t>
+              <a:t>10/26/2023</a:t>
             </a:fld>
             <a:endParaRPr lang="en-US"/>
           </a:p>
@@ -812,7 +812,7 @@
           <a:p>
             <a:fld id="{D361DC46-4C98-4A65-A426-E76E09BB01EE}" type="datetimeFigureOut">
               <a:rPr lang="en-US" smtClean="0"/>
-              <a:t>10/24/23</a:t>
+              <a:t>10/26/2023</a:t>
             </a:fld>
             <a:endParaRPr lang="en-US"/>
           </a:p>
@@ -1020,7 +1020,7 @@
           <a:p>
             <a:fld id="{D361DC46-4C98-4A65-A426-E76E09BB01EE}" type="datetimeFigureOut">
               <a:rPr lang="en-US" smtClean="0"/>
-              <a:t>10/24/23</a:t>
+              <a:t>10/26/2023</a:t>
             </a:fld>
             <a:endParaRPr lang="en-US"/>
           </a:p>
@@ -1218,7 +1218,7 @@
           <a:p>
             <a:fld id="{D361DC46-4C98-4A65-A426-E76E09BB01EE}" type="datetimeFigureOut">
               <a:rPr lang="en-US" smtClean="0"/>
-              <a:t>10/24/23</a:t>
+              <a:t>10/26/2023</a:t>
             </a:fld>
             <a:endParaRPr lang="en-US"/>
           </a:p>
@@ -1493,7 +1493,7 @@
           <a:p>
             <a:fld id="{D361DC46-4C98-4A65-A426-E76E09BB01EE}" type="datetimeFigureOut">
               <a:rPr lang="en-US" smtClean="0"/>
-              <a:t>10/24/23</a:t>
+              <a:t>10/26/2023</a:t>
             </a:fld>
             <a:endParaRPr lang="en-US"/>
           </a:p>
@@ -1758,7 +1758,7 @@
           <a:p>
             <a:fld id="{D361DC46-4C98-4A65-A426-E76E09BB01EE}" type="datetimeFigureOut">
               <a:rPr lang="en-US" smtClean="0"/>
-              <a:t>10/24/23</a:t>
+              <a:t>10/26/2023</a:t>
             </a:fld>
             <a:endParaRPr lang="en-US"/>
           </a:p>
@@ -2170,7 +2170,7 @@
           <a:p>
             <a:fld id="{D361DC46-4C98-4A65-A426-E76E09BB01EE}" type="datetimeFigureOut">
               <a:rPr lang="en-US" smtClean="0"/>
-              <a:t>10/24/23</a:t>
+              <a:t>10/26/2023</a:t>
             </a:fld>
             <a:endParaRPr lang="en-US"/>
           </a:p>
@@ -2311,7 +2311,7 @@
           <a:p>
             <a:fld id="{D361DC46-4C98-4A65-A426-E76E09BB01EE}" type="datetimeFigureOut">
               <a:rPr lang="en-US" smtClean="0"/>
-              <a:t>10/24/23</a:t>
+              <a:t>10/26/2023</a:t>
             </a:fld>
             <a:endParaRPr lang="en-US"/>
           </a:p>
@@ -2424,7 +2424,7 @@
           <a:p>
             <a:fld id="{D361DC46-4C98-4A65-A426-E76E09BB01EE}" type="datetimeFigureOut">
               <a:rPr lang="en-US" smtClean="0"/>
-              <a:t>10/24/23</a:t>
+              <a:t>10/26/2023</a:t>
             </a:fld>
             <a:endParaRPr lang="en-US"/>
           </a:p>
@@ -2735,7 +2735,7 @@
           <a:p>
             <a:fld id="{D361DC46-4C98-4A65-A426-E76E09BB01EE}" type="datetimeFigureOut">
               <a:rPr lang="en-US" smtClean="0"/>
-              <a:t>10/24/23</a:t>
+              <a:t>10/26/2023</a:t>
             </a:fld>
             <a:endParaRPr lang="en-US"/>
           </a:p>
@@ -3023,7 +3023,7 @@
           <a:p>
             <a:fld id="{D361DC46-4C98-4A65-A426-E76E09BB01EE}" type="datetimeFigureOut">
               <a:rPr lang="en-US" smtClean="0"/>
-              <a:t>10/24/23</a:t>
+              <a:t>10/26/2023</a:t>
             </a:fld>
             <a:endParaRPr lang="en-US"/>
           </a:p>
@@ -3264,7 +3264,7 @@
           <a:p>
             <a:fld id="{D361DC46-4C98-4A65-A426-E76E09BB01EE}" type="datetimeFigureOut">
               <a:rPr lang="en-US" smtClean="0"/>
-              <a:t>10/24/23</a:t>
+              <a:t>10/26/2023</a:t>
             </a:fld>
             <a:endParaRPr lang="en-US"/>
           </a:p>
@@ -4079,6 +4079,86 @@
           </a:p>
         </p:txBody>
       </p:sp>
+      <p:sp>
+        <p:nvSpPr>
+          <p:cNvPr id="11" name="TextBox 10">
+            <a:extLst>
+              <a:ext uri="{FF2B5EF4-FFF2-40B4-BE49-F238E27FC236}">
+                <a16:creationId xmlns:a16="http://schemas.microsoft.com/office/drawing/2014/main" id="{FCB59BAB-2460-C1E6-ABC6-A3EB6B3D1EE2}"/>
+              </a:ext>
+            </a:extLst>
+          </p:cNvPr>
+          <p:cNvSpPr txBox="1"/>
+          <p:nvPr/>
+        </p:nvSpPr>
+        <p:spPr>
+          <a:xfrm>
+            <a:off x="2121700" y="94296"/>
+            <a:ext cx="2811582" cy="523220"/>
+          </a:xfrm>
+          <a:prstGeom prst="rect">
+            <a:avLst/>
+          </a:prstGeom>
+          <a:noFill/>
+        </p:spPr>
+        <p:txBody>
+          <a:bodyPr wrap="square" rtlCol="0">
+            <a:spAutoFit/>
+          </a:bodyPr>
+          <a:lstStyle/>
+          <a:p>
+            <a:r>
+              <a:rPr lang="en-US" sz="2800" dirty="0"/>
+              <a:t>Pre-</a:t>
+            </a:r>
+            <a:r>
+              <a:rPr lang="en-US" sz="2800" dirty="0" err="1"/>
+              <a:t>DecNef</a:t>
+            </a:r>
+            <a:endParaRPr lang="en-US" sz="2800" dirty="0"/>
+          </a:p>
+        </p:txBody>
+      </p:sp>
+      <p:sp>
+        <p:nvSpPr>
+          <p:cNvPr id="12" name="TextBox 11">
+            <a:extLst>
+              <a:ext uri="{FF2B5EF4-FFF2-40B4-BE49-F238E27FC236}">
+                <a16:creationId xmlns:a16="http://schemas.microsoft.com/office/drawing/2014/main" id="{A9F670C1-47AE-EEC6-68BE-5D1ACCDA4417}"/>
+              </a:ext>
+            </a:extLst>
+          </p:cNvPr>
+          <p:cNvSpPr txBox="1"/>
+          <p:nvPr/>
+        </p:nvSpPr>
+        <p:spPr>
+          <a:xfrm>
+            <a:off x="8356118" y="94296"/>
+            <a:ext cx="2811582" cy="523220"/>
+          </a:xfrm>
+          <a:prstGeom prst="rect">
+            <a:avLst/>
+          </a:prstGeom>
+          <a:noFill/>
+        </p:spPr>
+        <p:txBody>
+          <a:bodyPr wrap="square" rtlCol="0">
+            <a:spAutoFit/>
+          </a:bodyPr>
+          <a:lstStyle/>
+          <a:p>
+            <a:r>
+              <a:rPr lang="en-US" sz="2800" dirty="0"/>
+              <a:t>Post-</a:t>
+            </a:r>
+            <a:r>
+              <a:rPr lang="en-US" sz="2800" dirty="0" err="1"/>
+              <a:t>DecNef</a:t>
+            </a:r>
+            <a:endParaRPr lang="en-US" sz="2800" dirty="0"/>
+          </a:p>
+        </p:txBody>
+      </p:sp>
     </p:spTree>
     <p:extLst>
       <p:ext uri="{BB962C8B-B14F-4D97-AF65-F5344CB8AC3E}">
@@ -4594,6 +4674,115 @@
             <a:r>
               <a:rPr lang="en-US" sz="4400" b="1" dirty="0"/>
               <a:t>B</a:t>
+            </a:r>
+          </a:p>
+        </p:txBody>
+      </p:sp>
+      <p:sp>
+        <p:nvSpPr>
+          <p:cNvPr id="2" name="TextBox 1">
+            <a:extLst>
+              <a:ext uri="{FF2B5EF4-FFF2-40B4-BE49-F238E27FC236}">
+                <a16:creationId xmlns:a16="http://schemas.microsoft.com/office/drawing/2014/main" id="{09022512-590C-D4A6-56F5-FAD35737A632}"/>
+              </a:ext>
+            </a:extLst>
+          </p:cNvPr>
+          <p:cNvSpPr txBox="1"/>
+          <p:nvPr/>
+        </p:nvSpPr>
+        <p:spPr>
+          <a:xfrm>
+            <a:off x="3305014" y="1807009"/>
+            <a:ext cx="764697" cy="369332"/>
+          </a:xfrm>
+          <a:prstGeom prst="rect">
+            <a:avLst/>
+          </a:prstGeom>
+          <a:noFill/>
+        </p:spPr>
+        <p:txBody>
+          <a:bodyPr wrap="none" rtlCol="0">
+            <a:spAutoFit/>
+          </a:bodyPr>
+          <a:lstStyle/>
+          <a:p>
+            <a:r>
+              <a:rPr lang="en-US" dirty="0"/>
+              <a:t>Target</a:t>
+            </a:r>
+          </a:p>
+        </p:txBody>
+      </p:sp>
+      <p:sp>
+        <p:nvSpPr>
+          <p:cNvPr id="3" name="TextBox 2">
+            <a:extLst>
+              <a:ext uri="{FF2B5EF4-FFF2-40B4-BE49-F238E27FC236}">
+                <a16:creationId xmlns:a16="http://schemas.microsoft.com/office/drawing/2014/main" id="{F1345405-B8B0-591E-3F71-DBC7E5AD8235}"/>
+              </a:ext>
+            </a:extLst>
+          </p:cNvPr>
+          <p:cNvSpPr txBox="1"/>
+          <p:nvPr/>
+        </p:nvSpPr>
+        <p:spPr>
+          <a:xfrm>
+            <a:off x="9087572" y="1807009"/>
+            <a:ext cx="877741" cy="369332"/>
+          </a:xfrm>
+          <a:prstGeom prst="rect">
+            <a:avLst/>
+          </a:prstGeom>
+          <a:noFill/>
+        </p:spPr>
+        <p:txBody>
+          <a:bodyPr wrap="none" rtlCol="0">
+            <a:spAutoFit/>
+          </a:bodyPr>
+          <a:lstStyle/>
+          <a:p>
+            <a:r>
+              <a:rPr lang="en-US" dirty="0"/>
+              <a:t>Control</a:t>
+            </a:r>
+          </a:p>
+        </p:txBody>
+      </p:sp>
+      <p:sp>
+        <p:nvSpPr>
+          <p:cNvPr id="4" name="TextBox 3">
+            <a:extLst>
+              <a:ext uri="{FF2B5EF4-FFF2-40B4-BE49-F238E27FC236}">
+                <a16:creationId xmlns:a16="http://schemas.microsoft.com/office/drawing/2014/main" id="{8DF73C33-7AFA-72F9-6283-2625FDE67A78}"/>
+              </a:ext>
+            </a:extLst>
+          </p:cNvPr>
+          <p:cNvSpPr txBox="1"/>
+          <p:nvPr/>
+        </p:nvSpPr>
+        <p:spPr>
+          <a:xfrm>
+            <a:off x="5510145" y="4302676"/>
+            <a:ext cx="300082" cy="369332"/>
+          </a:xfrm>
+          <a:prstGeom prst="rect">
+            <a:avLst/>
+          </a:prstGeom>
+          <a:noFill/>
+        </p:spPr>
+        <p:txBody>
+          <a:bodyPr wrap="none" rtlCol="0">
+            <a:spAutoFit/>
+          </a:bodyPr>
+          <a:lstStyle/>
+          <a:p>
+            <a:r>
+              <a:rPr lang="en-US" dirty="0">
+                <a:solidFill>
+                  <a:srgbClr val="BE2F11"/>
+                </a:solidFill>
+              </a:rPr>
+              <a:t>*</a:t>
             </a:r>
           </a:p>
         </p:txBody>

</xml_diff>

<commit_message>
updated with vincent's figures and adjusted scatterplot
</commit_message>
<xml_diff>
--- a/restingstate_figures.pptx
+++ b/restingstate_figures.pptx
@@ -200,7 +200,7 @@
           <a:p>
             <a:fld id="{6A55DAFD-ECC9-4E86-9372-AA175A96D8F5}" type="datetimeFigureOut">
               <a:rPr lang="en-US" smtClean="0"/>
-              <a:t>10/26/2023</a:t>
+              <a:t>10/30/2023</a:t>
             </a:fld>
             <a:endParaRPr lang="en-US"/>
           </a:p>
@@ -614,7 +614,7 @@
           <a:p>
             <a:fld id="{D361DC46-4C98-4A65-A426-E76E09BB01EE}" type="datetimeFigureOut">
               <a:rPr lang="en-US" smtClean="0"/>
-              <a:t>10/26/2023</a:t>
+              <a:t>10/30/2023</a:t>
             </a:fld>
             <a:endParaRPr lang="en-US"/>
           </a:p>
@@ -812,7 +812,7 @@
           <a:p>
             <a:fld id="{D361DC46-4C98-4A65-A426-E76E09BB01EE}" type="datetimeFigureOut">
               <a:rPr lang="en-US" smtClean="0"/>
-              <a:t>10/26/2023</a:t>
+              <a:t>10/30/2023</a:t>
             </a:fld>
             <a:endParaRPr lang="en-US"/>
           </a:p>
@@ -1020,7 +1020,7 @@
           <a:p>
             <a:fld id="{D361DC46-4C98-4A65-A426-E76E09BB01EE}" type="datetimeFigureOut">
               <a:rPr lang="en-US" smtClean="0"/>
-              <a:t>10/26/2023</a:t>
+              <a:t>10/30/2023</a:t>
             </a:fld>
             <a:endParaRPr lang="en-US"/>
           </a:p>
@@ -1218,7 +1218,7 @@
           <a:p>
             <a:fld id="{D361DC46-4C98-4A65-A426-E76E09BB01EE}" type="datetimeFigureOut">
               <a:rPr lang="en-US" smtClean="0"/>
-              <a:t>10/26/2023</a:t>
+              <a:t>10/30/2023</a:t>
             </a:fld>
             <a:endParaRPr lang="en-US"/>
           </a:p>
@@ -1493,7 +1493,7 @@
           <a:p>
             <a:fld id="{D361DC46-4C98-4A65-A426-E76E09BB01EE}" type="datetimeFigureOut">
               <a:rPr lang="en-US" smtClean="0"/>
-              <a:t>10/26/2023</a:t>
+              <a:t>10/30/2023</a:t>
             </a:fld>
             <a:endParaRPr lang="en-US"/>
           </a:p>
@@ -1758,7 +1758,7 @@
           <a:p>
             <a:fld id="{D361DC46-4C98-4A65-A426-E76E09BB01EE}" type="datetimeFigureOut">
               <a:rPr lang="en-US" smtClean="0"/>
-              <a:t>10/26/2023</a:t>
+              <a:t>10/30/2023</a:t>
             </a:fld>
             <a:endParaRPr lang="en-US"/>
           </a:p>
@@ -2170,7 +2170,7 @@
           <a:p>
             <a:fld id="{D361DC46-4C98-4A65-A426-E76E09BB01EE}" type="datetimeFigureOut">
               <a:rPr lang="en-US" smtClean="0"/>
-              <a:t>10/26/2023</a:t>
+              <a:t>10/30/2023</a:t>
             </a:fld>
             <a:endParaRPr lang="en-US"/>
           </a:p>
@@ -2311,7 +2311,7 @@
           <a:p>
             <a:fld id="{D361DC46-4C98-4A65-A426-E76E09BB01EE}" type="datetimeFigureOut">
               <a:rPr lang="en-US" smtClean="0"/>
-              <a:t>10/26/2023</a:t>
+              <a:t>10/30/2023</a:t>
             </a:fld>
             <a:endParaRPr lang="en-US"/>
           </a:p>
@@ -2424,7 +2424,7 @@
           <a:p>
             <a:fld id="{D361DC46-4C98-4A65-A426-E76E09BB01EE}" type="datetimeFigureOut">
               <a:rPr lang="en-US" smtClean="0"/>
-              <a:t>10/26/2023</a:t>
+              <a:t>10/30/2023</a:t>
             </a:fld>
             <a:endParaRPr lang="en-US"/>
           </a:p>
@@ -2735,7 +2735,7 @@
           <a:p>
             <a:fld id="{D361DC46-4C98-4A65-A426-E76E09BB01EE}" type="datetimeFigureOut">
               <a:rPr lang="en-US" smtClean="0"/>
-              <a:t>10/26/2023</a:t>
+              <a:t>10/30/2023</a:t>
             </a:fld>
             <a:endParaRPr lang="en-US"/>
           </a:p>
@@ -3023,7 +3023,7 @@
           <a:p>
             <a:fld id="{D361DC46-4C98-4A65-A426-E76E09BB01EE}" type="datetimeFigureOut">
               <a:rPr lang="en-US" smtClean="0"/>
-              <a:t>10/26/2023</a:t>
+              <a:t>10/30/2023</a:t>
             </a:fld>
             <a:endParaRPr lang="en-US"/>
           </a:p>
@@ -3264,7 +3264,7 @@
           <a:p>
             <a:fld id="{D361DC46-4C98-4A65-A426-E76E09BB01EE}" type="datetimeFigureOut">
               <a:rPr lang="en-US" smtClean="0"/>
-              <a:t>10/26/2023</a:t>
+              <a:t>10/30/2023</a:t>
             </a:fld>
             <a:endParaRPr lang="en-US"/>
           </a:p>
@@ -3681,12 +3681,56 @@
           <a:chExt cx="0" cy="0"/>
         </a:xfrm>
       </p:grpSpPr>
+      <p:sp>
+        <p:nvSpPr>
+          <p:cNvPr id="5" name="TextBox 4">
+            <a:extLst>
+              <a:ext uri="{FF2B5EF4-FFF2-40B4-BE49-F238E27FC236}">
+                <a16:creationId xmlns:a16="http://schemas.microsoft.com/office/drawing/2014/main" id="{2C1E8CCE-067B-B6CA-96E9-633E6EE25799}"/>
+              </a:ext>
+            </a:extLst>
+          </p:cNvPr>
+          <p:cNvSpPr txBox="1"/>
+          <p:nvPr/>
+        </p:nvSpPr>
+        <p:spPr>
+          <a:xfrm>
+            <a:off x="1846584" y="5206131"/>
+            <a:ext cx="8498832" cy="1477328"/>
+          </a:xfrm>
+          <a:prstGeom prst="rect">
+            <a:avLst/>
+          </a:prstGeom>
+          <a:noFill/>
+        </p:spPr>
+        <p:txBody>
+          <a:bodyPr wrap="square" rtlCol="0">
+            <a:spAutoFit/>
+          </a:bodyPr>
+          <a:lstStyle/>
+          <a:p>
+            <a:r>
+              <a:rPr lang="en-US" dirty="0"/>
+              <a:t>Caption: A. Maps of resting state network activation. Resting state network activation at pre-treatment (blue/green) over significant increases in resting state network from pre-treatment to post-treatment (red/yellow).</a:t>
+            </a:r>
+          </a:p>
+          <a:p>
+            <a:endParaRPr lang="en-US" dirty="0"/>
+          </a:p>
+          <a:p>
+            <a:r>
+              <a:rPr lang="en-US" dirty="0"/>
+              <a:t>B. Map of resting state network activation at post-treatment (blue/green).</a:t>
+            </a:r>
+          </a:p>
+        </p:txBody>
+      </p:sp>
       <p:pic>
         <p:nvPicPr>
-          <p:cNvPr id="3" name="Picture 2" descr="A picture containing map&#10;&#10;Description automatically generated">
-            <a:extLst>
-              <a:ext uri="{FF2B5EF4-FFF2-40B4-BE49-F238E27FC236}">
-                <a16:creationId xmlns:a16="http://schemas.microsoft.com/office/drawing/2014/main" id="{645DD9C4-D658-5EC1-F876-B0D63E88E662}"/>
+          <p:cNvPr id="9" name="Picture 8">
+            <a:extLst>
+              <a:ext uri="{FF2B5EF4-FFF2-40B4-BE49-F238E27FC236}">
+                <a16:creationId xmlns:a16="http://schemas.microsoft.com/office/drawing/2014/main" id="{9DC92D89-548C-7D3B-66BC-4E9A74179184}"/>
               </a:ext>
             </a:extLst>
           </p:cNvPr>
@@ -3709,8 +3753,8 @@
         </p:blipFill>
         <p:spPr>
           <a:xfrm>
-            <a:off x="1431944" y="247853"/>
-            <a:ext cx="3600695" cy="3600695"/>
+            <a:off x="5207287" y="3964122"/>
+            <a:ext cx="1866824" cy="75174"/>
           </a:xfrm>
           <a:prstGeom prst="rect">
             <a:avLst/>
@@ -3719,10 +3763,10 @@
       </p:pic>
       <p:sp>
         <p:nvSpPr>
-          <p:cNvPr id="5" name="TextBox 4">
-            <a:extLst>
-              <a:ext uri="{FF2B5EF4-FFF2-40B4-BE49-F238E27FC236}">
-                <a16:creationId xmlns:a16="http://schemas.microsoft.com/office/drawing/2014/main" id="{2C1E8CCE-067B-B6CA-96E9-633E6EE25799}"/>
+          <p:cNvPr id="10" name="TextBox 9">
+            <a:extLst>
+              <a:ext uri="{FF2B5EF4-FFF2-40B4-BE49-F238E27FC236}">
+                <a16:creationId xmlns:a16="http://schemas.microsoft.com/office/drawing/2014/main" id="{4B651923-2DAC-3EC4-35A5-D95E98B5F7B6}"/>
               </a:ext>
             </a:extLst>
           </p:cNvPr>
@@ -3731,8 +3775,8 @@
         </p:nvSpPr>
         <p:spPr>
           <a:xfrm>
-            <a:off x="2121700" y="4972318"/>
-            <a:ext cx="8498832" cy="1477328"/>
+            <a:off x="5109580" y="3995726"/>
+            <a:ext cx="2143016" cy="261610"/>
           </a:xfrm>
           <a:prstGeom prst="rect">
             <a:avLst/>
@@ -3746,27 +3790,18 @@
           <a:lstStyle/>
           <a:p>
             <a:r>
-              <a:rPr lang="en-US" dirty="0"/>
-              <a:t>Caption: A. Maps of resting state network activation. Resting state network activation at pre-treatment (blue/green) over significant increases in resting state network from pre-treatment to post-treatment (red/yellow).</a:t>
-            </a:r>
-          </a:p>
-          <a:p>
-            <a:endParaRPr lang="en-US" dirty="0"/>
-          </a:p>
-          <a:p>
-            <a:r>
-              <a:rPr lang="en-US" dirty="0"/>
-              <a:t>B. Map of resting state network activation at post-treatment (blue/green).</a:t>
+              <a:rPr lang="en-US" sz="1100" dirty="0"/>
+              <a:t>0                      6.25                   12.5</a:t>
             </a:r>
           </a:p>
         </p:txBody>
       </p:sp>
       <p:pic>
         <p:nvPicPr>
-          <p:cNvPr id="9" name="Picture 8">
-            <a:extLst>
-              <a:ext uri="{FF2B5EF4-FFF2-40B4-BE49-F238E27FC236}">
-                <a16:creationId xmlns:a16="http://schemas.microsoft.com/office/drawing/2014/main" id="{9DC92D89-548C-7D3B-66BC-4E9A74179184}"/>
+          <p:cNvPr id="13" name="Picture 12">
+            <a:extLst>
+              <a:ext uri="{FF2B5EF4-FFF2-40B4-BE49-F238E27FC236}">
+                <a16:creationId xmlns:a16="http://schemas.microsoft.com/office/drawing/2014/main" id="{0B48A1AB-21A4-9998-19F1-FC75952C145D}"/>
               </a:ext>
             </a:extLst>
           </p:cNvPr>
@@ -3789,8 +3824,8 @@
         </p:blipFill>
         <p:spPr>
           <a:xfrm>
-            <a:off x="5233040" y="3613974"/>
-            <a:ext cx="1866824" cy="75174"/>
+            <a:off x="5207287" y="4501243"/>
+            <a:ext cx="1866824" cy="81166"/>
           </a:xfrm>
           <a:prstGeom prst="rect">
             <a:avLst/>
@@ -3799,10 +3834,10 @@
       </p:pic>
       <p:sp>
         <p:nvSpPr>
-          <p:cNvPr id="10" name="TextBox 9">
-            <a:extLst>
-              <a:ext uri="{FF2B5EF4-FFF2-40B4-BE49-F238E27FC236}">
-                <a16:creationId xmlns:a16="http://schemas.microsoft.com/office/drawing/2014/main" id="{4B651923-2DAC-3EC4-35A5-D95E98B5F7B6}"/>
+          <p:cNvPr id="14" name="TextBox 13">
+            <a:extLst>
+              <a:ext uri="{FF2B5EF4-FFF2-40B4-BE49-F238E27FC236}">
+                <a16:creationId xmlns:a16="http://schemas.microsoft.com/office/drawing/2014/main" id="{296F416B-CE4A-A0F5-90F3-871256293F6E}"/>
               </a:ext>
             </a:extLst>
           </p:cNvPr>
@@ -3811,7 +3846,7 @@
         </p:nvSpPr>
         <p:spPr>
           <a:xfrm>
-            <a:off x="5135333" y="3645578"/>
+            <a:off x="5109579" y="4570701"/>
             <a:ext cx="2143016" cy="261610"/>
           </a:xfrm>
           <a:prstGeom prst="rect">
@@ -3827,17 +3862,237 @@
           <a:p>
             <a:r>
               <a:rPr lang="en-US" sz="1100" dirty="0"/>
-              <a:t>0                      6.25                   12.5</a:t>
-            </a:r>
+              <a:t>0                         3                           6</a:t>
+            </a:r>
+          </a:p>
+        </p:txBody>
+      </p:sp>
+      <p:sp>
+        <p:nvSpPr>
+          <p:cNvPr id="4" name="TextBox 3">
+            <a:extLst>
+              <a:ext uri="{FF2B5EF4-FFF2-40B4-BE49-F238E27FC236}">
+                <a16:creationId xmlns:a16="http://schemas.microsoft.com/office/drawing/2014/main" id="{BE9974EC-69BA-E4F3-CF5D-0324A9B490C4}"/>
+              </a:ext>
+            </a:extLst>
+          </p:cNvPr>
+          <p:cNvSpPr txBox="1"/>
+          <p:nvPr/>
+        </p:nvSpPr>
+        <p:spPr>
+          <a:xfrm>
+            <a:off x="5851317" y="4744443"/>
+            <a:ext cx="494046" cy="261610"/>
+          </a:xfrm>
+          <a:prstGeom prst="rect">
+            <a:avLst/>
+          </a:prstGeom>
+          <a:noFill/>
+        </p:spPr>
+        <p:txBody>
+          <a:bodyPr wrap="none" rtlCol="0">
+            <a:spAutoFit/>
+          </a:bodyPr>
+          <a:lstStyle/>
+          <a:p>
+            <a:r>
+              <a:rPr lang="en-US" sz="1100" i="1" dirty="0"/>
+              <a:t>t-stat</a:t>
+            </a:r>
+          </a:p>
+        </p:txBody>
+      </p:sp>
+      <p:sp>
+        <p:nvSpPr>
+          <p:cNvPr id="8" name="TextBox 7">
+            <a:extLst>
+              <a:ext uri="{FF2B5EF4-FFF2-40B4-BE49-F238E27FC236}">
+                <a16:creationId xmlns:a16="http://schemas.microsoft.com/office/drawing/2014/main" id="{DDD02899-178B-57B4-51DB-E3E6A4DBE653}"/>
+              </a:ext>
+            </a:extLst>
+          </p:cNvPr>
+          <p:cNvSpPr txBox="1"/>
+          <p:nvPr/>
+        </p:nvSpPr>
+        <p:spPr>
+          <a:xfrm>
+            <a:off x="5841699" y="4199898"/>
+            <a:ext cx="503664" cy="261610"/>
+          </a:xfrm>
+          <a:prstGeom prst="rect">
+            <a:avLst/>
+          </a:prstGeom>
+          <a:noFill/>
+        </p:spPr>
+        <p:txBody>
+          <a:bodyPr wrap="none" rtlCol="0">
+            <a:spAutoFit/>
+          </a:bodyPr>
+          <a:lstStyle/>
+          <a:p>
+            <a:r>
+              <a:rPr lang="en-US" sz="1100" i="1" dirty="0"/>
+              <a:t>z-stat</a:t>
+            </a:r>
+          </a:p>
+        </p:txBody>
+      </p:sp>
+      <p:sp>
+        <p:nvSpPr>
+          <p:cNvPr id="6" name="TextBox 5">
+            <a:extLst>
+              <a:ext uri="{FF2B5EF4-FFF2-40B4-BE49-F238E27FC236}">
+                <a16:creationId xmlns:a16="http://schemas.microsoft.com/office/drawing/2014/main" id="{9C3ED19E-7EEB-5E35-36EF-C810AD1BE516}"/>
+              </a:ext>
+            </a:extLst>
+          </p:cNvPr>
+          <p:cNvSpPr txBox="1"/>
+          <p:nvPr/>
+        </p:nvSpPr>
+        <p:spPr>
+          <a:xfrm>
+            <a:off x="669545" y="901895"/>
+            <a:ext cx="526106" cy="769441"/>
+          </a:xfrm>
+          <a:prstGeom prst="rect">
+            <a:avLst/>
+          </a:prstGeom>
+          <a:noFill/>
+        </p:spPr>
+        <p:txBody>
+          <a:bodyPr wrap="none" rtlCol="0">
+            <a:spAutoFit/>
+          </a:bodyPr>
+          <a:lstStyle/>
+          <a:p>
+            <a:r>
+              <a:rPr lang="en-US" sz="4400" b="1" dirty="0"/>
+              <a:t>A</a:t>
+            </a:r>
+          </a:p>
+        </p:txBody>
+      </p:sp>
+      <p:sp>
+        <p:nvSpPr>
+          <p:cNvPr id="7" name="TextBox 6">
+            <a:extLst>
+              <a:ext uri="{FF2B5EF4-FFF2-40B4-BE49-F238E27FC236}">
+                <a16:creationId xmlns:a16="http://schemas.microsoft.com/office/drawing/2014/main" id="{B5D4C74E-7540-43D1-1B53-1C64D8372305}"/>
+              </a:ext>
+            </a:extLst>
+          </p:cNvPr>
+          <p:cNvSpPr txBox="1"/>
+          <p:nvPr/>
+        </p:nvSpPr>
+        <p:spPr>
+          <a:xfrm>
+            <a:off x="4333944" y="901895"/>
+            <a:ext cx="500458" cy="769441"/>
+          </a:xfrm>
+          <a:prstGeom prst="rect">
+            <a:avLst/>
+          </a:prstGeom>
+          <a:noFill/>
+        </p:spPr>
+        <p:txBody>
+          <a:bodyPr wrap="none" rtlCol="0">
+            <a:spAutoFit/>
+          </a:bodyPr>
+          <a:lstStyle/>
+          <a:p>
+            <a:r>
+              <a:rPr lang="en-US" sz="4400" b="1" dirty="0"/>
+              <a:t>B</a:t>
+            </a:r>
+          </a:p>
+        </p:txBody>
+      </p:sp>
+      <p:sp>
+        <p:nvSpPr>
+          <p:cNvPr id="11" name="TextBox 10">
+            <a:extLst>
+              <a:ext uri="{FF2B5EF4-FFF2-40B4-BE49-F238E27FC236}">
+                <a16:creationId xmlns:a16="http://schemas.microsoft.com/office/drawing/2014/main" id="{FCB59BAB-2460-C1E6-ABC6-A3EB6B3D1EE2}"/>
+              </a:ext>
+            </a:extLst>
+          </p:cNvPr>
+          <p:cNvSpPr txBox="1"/>
+          <p:nvPr/>
+        </p:nvSpPr>
+        <p:spPr>
+          <a:xfrm>
+            <a:off x="1316357" y="498509"/>
+            <a:ext cx="2811582" cy="523220"/>
+          </a:xfrm>
+          <a:prstGeom prst="rect">
+            <a:avLst/>
+          </a:prstGeom>
+          <a:noFill/>
+        </p:spPr>
+        <p:txBody>
+          <a:bodyPr wrap="square" rtlCol="0">
+            <a:spAutoFit/>
+          </a:bodyPr>
+          <a:lstStyle/>
+          <a:p>
+            <a:r>
+              <a:rPr lang="en-US" sz="2800" dirty="0"/>
+              <a:t>Pre-</a:t>
+            </a:r>
+            <a:r>
+              <a:rPr lang="en-US" sz="2800" dirty="0" err="1"/>
+              <a:t>DecNef</a:t>
+            </a:r>
+            <a:endParaRPr lang="en-US" sz="2800" dirty="0"/>
+          </a:p>
+        </p:txBody>
+      </p:sp>
+      <p:sp>
+        <p:nvSpPr>
+          <p:cNvPr id="12" name="TextBox 11">
+            <a:extLst>
+              <a:ext uri="{FF2B5EF4-FFF2-40B4-BE49-F238E27FC236}">
+                <a16:creationId xmlns:a16="http://schemas.microsoft.com/office/drawing/2014/main" id="{A9F670C1-47AE-EEC6-68BE-5D1ACCDA4417}"/>
+              </a:ext>
+            </a:extLst>
+          </p:cNvPr>
+          <p:cNvSpPr txBox="1"/>
+          <p:nvPr/>
+        </p:nvSpPr>
+        <p:spPr>
+          <a:xfrm>
+            <a:off x="5109579" y="523996"/>
+            <a:ext cx="2063008" cy="523220"/>
+          </a:xfrm>
+          <a:prstGeom prst="rect">
+            <a:avLst/>
+          </a:prstGeom>
+          <a:noFill/>
+        </p:spPr>
+        <p:txBody>
+          <a:bodyPr wrap="square" rtlCol="0">
+            <a:spAutoFit/>
+          </a:bodyPr>
+          <a:lstStyle/>
+          <a:p>
+            <a:r>
+              <a:rPr lang="en-US" sz="2800" dirty="0"/>
+              <a:t>Post-</a:t>
+            </a:r>
+            <a:r>
+              <a:rPr lang="en-US" sz="2800" dirty="0" err="1"/>
+              <a:t>DecNef</a:t>
+            </a:r>
+            <a:endParaRPr lang="en-US" sz="2800" dirty="0"/>
           </a:p>
         </p:txBody>
       </p:sp>
       <p:pic>
         <p:nvPicPr>
-          <p:cNvPr id="13" name="Picture 12">
-            <a:extLst>
-              <a:ext uri="{FF2B5EF4-FFF2-40B4-BE49-F238E27FC236}">
-                <a16:creationId xmlns:a16="http://schemas.microsoft.com/office/drawing/2014/main" id="{0B48A1AB-21A4-9998-19F1-FC75952C145D}"/>
+          <p:cNvPr id="16" name="Picture 15" descr="A close up of a brain&#10;&#10;Description automatically generated">
+            <a:extLst>
+              <a:ext uri="{FF2B5EF4-FFF2-40B4-BE49-F238E27FC236}">
+                <a16:creationId xmlns:a16="http://schemas.microsoft.com/office/drawing/2014/main" id="{C148352F-98E5-E70C-A57A-8067A699FD1B}"/>
               </a:ext>
             </a:extLst>
           </p:cNvPr>
@@ -3860,125 +4115,20 @@
         </p:blipFill>
         <p:spPr>
           <a:xfrm>
-            <a:off x="5233040" y="4151095"/>
-            <a:ext cx="1866824" cy="81166"/>
+            <a:off x="910253" y="1362018"/>
+            <a:ext cx="2706441" cy="2283560"/>
           </a:xfrm>
           <a:prstGeom prst="rect">
             <a:avLst/>
           </a:prstGeom>
         </p:spPr>
       </p:pic>
-      <p:sp>
-        <p:nvSpPr>
-          <p:cNvPr id="14" name="TextBox 13">
-            <a:extLst>
-              <a:ext uri="{FF2B5EF4-FFF2-40B4-BE49-F238E27FC236}">
-                <a16:creationId xmlns:a16="http://schemas.microsoft.com/office/drawing/2014/main" id="{296F416B-CE4A-A0F5-90F3-871256293F6E}"/>
-              </a:ext>
-            </a:extLst>
-          </p:cNvPr>
-          <p:cNvSpPr txBox="1"/>
-          <p:nvPr/>
-        </p:nvSpPr>
-        <p:spPr>
-          <a:xfrm>
-            <a:off x="5135332" y="4220553"/>
-            <a:ext cx="2143016" cy="261610"/>
-          </a:xfrm>
-          <a:prstGeom prst="rect">
-            <a:avLst/>
-          </a:prstGeom>
-          <a:noFill/>
-        </p:spPr>
-        <p:txBody>
-          <a:bodyPr wrap="square" rtlCol="0">
-            <a:spAutoFit/>
-          </a:bodyPr>
-          <a:lstStyle/>
-          <a:p>
-            <a:r>
-              <a:rPr lang="en-US" sz="1100" dirty="0"/>
-              <a:t>0                         3                           6</a:t>
-            </a:r>
-          </a:p>
-        </p:txBody>
-      </p:sp>
-      <p:sp>
-        <p:nvSpPr>
-          <p:cNvPr id="4" name="TextBox 3">
-            <a:extLst>
-              <a:ext uri="{FF2B5EF4-FFF2-40B4-BE49-F238E27FC236}">
-                <a16:creationId xmlns:a16="http://schemas.microsoft.com/office/drawing/2014/main" id="{BE9974EC-69BA-E4F3-CF5D-0324A9B490C4}"/>
-              </a:ext>
-            </a:extLst>
-          </p:cNvPr>
-          <p:cNvSpPr txBox="1"/>
-          <p:nvPr/>
-        </p:nvSpPr>
-        <p:spPr>
-          <a:xfrm>
-            <a:off x="5877070" y="4394295"/>
-            <a:ext cx="494046" cy="261610"/>
-          </a:xfrm>
-          <a:prstGeom prst="rect">
-            <a:avLst/>
-          </a:prstGeom>
-          <a:noFill/>
-        </p:spPr>
-        <p:txBody>
-          <a:bodyPr wrap="none" rtlCol="0">
-            <a:spAutoFit/>
-          </a:bodyPr>
-          <a:lstStyle/>
-          <a:p>
-            <a:r>
-              <a:rPr lang="en-US" sz="1100" i="1" dirty="0"/>
-              <a:t>t-stat</a:t>
-            </a:r>
-          </a:p>
-        </p:txBody>
-      </p:sp>
-      <p:sp>
-        <p:nvSpPr>
-          <p:cNvPr id="8" name="TextBox 7">
-            <a:extLst>
-              <a:ext uri="{FF2B5EF4-FFF2-40B4-BE49-F238E27FC236}">
-                <a16:creationId xmlns:a16="http://schemas.microsoft.com/office/drawing/2014/main" id="{DDD02899-178B-57B4-51DB-E3E6A4DBE653}"/>
-              </a:ext>
-            </a:extLst>
-          </p:cNvPr>
-          <p:cNvSpPr txBox="1"/>
-          <p:nvPr/>
-        </p:nvSpPr>
-        <p:spPr>
-          <a:xfrm>
-            <a:off x="5867452" y="3849750"/>
-            <a:ext cx="503664" cy="261610"/>
-          </a:xfrm>
-          <a:prstGeom prst="rect">
-            <a:avLst/>
-          </a:prstGeom>
-          <a:noFill/>
-        </p:spPr>
-        <p:txBody>
-          <a:bodyPr wrap="none" rtlCol="0">
-            <a:spAutoFit/>
-          </a:bodyPr>
-          <a:lstStyle/>
-          <a:p>
-            <a:r>
-              <a:rPr lang="en-US" sz="1100" i="1" dirty="0"/>
-              <a:t>z-stat</a:t>
-            </a:r>
-          </a:p>
-        </p:txBody>
-      </p:sp>
       <p:pic>
         <p:nvPicPr>
-          <p:cNvPr id="2" name="Picture 1" descr="A brain with blue spots&#10;&#10;Description automatically generated">
-            <a:extLst>
-              <a:ext uri="{FF2B5EF4-FFF2-40B4-BE49-F238E27FC236}">
-                <a16:creationId xmlns:a16="http://schemas.microsoft.com/office/drawing/2014/main" id="{96B60B48-CE3E-6CFC-A960-38F7A59AEB58}"/>
+          <p:cNvPr id="18" name="Picture 17" descr="A blue and grey brain&#10;&#10;Description automatically generated">
+            <a:extLst>
+              <a:ext uri="{FF2B5EF4-FFF2-40B4-BE49-F238E27FC236}">
+                <a16:creationId xmlns:a16="http://schemas.microsoft.com/office/drawing/2014/main" id="{027B97CD-D75A-115E-8F6C-1EC5581B4C7E}"/>
               </a:ext>
             </a:extLst>
           </p:cNvPr>
@@ -4001,8 +4151,8 @@
         </p:blipFill>
         <p:spPr>
           <a:xfrm>
-            <a:off x="7693752" y="225768"/>
-            <a:ext cx="3622780" cy="3622780"/>
+            <a:off x="4720491" y="1362018"/>
+            <a:ext cx="2751018" cy="2283560"/>
           </a:xfrm>
           <a:prstGeom prst="rect">
             <a:avLst/>
@@ -4011,10 +4161,10 @@
       </p:pic>
       <p:sp>
         <p:nvSpPr>
-          <p:cNvPr id="6" name="TextBox 5">
-            <a:extLst>
-              <a:ext uri="{FF2B5EF4-FFF2-40B4-BE49-F238E27FC236}">
-                <a16:creationId xmlns:a16="http://schemas.microsoft.com/office/drawing/2014/main" id="{9C3ED19E-7EEB-5E35-36EF-C810AD1BE516}"/>
+          <p:cNvPr id="19" name="TextBox 18">
+            <a:extLst>
+              <a:ext uri="{FF2B5EF4-FFF2-40B4-BE49-F238E27FC236}">
+                <a16:creationId xmlns:a16="http://schemas.microsoft.com/office/drawing/2014/main" id="{E06B71C6-F997-400C-6888-3DE2C21C805B}"/>
               </a:ext>
             </a:extLst>
           </p:cNvPr>
@@ -4023,8 +4173,8 @@
         </p:nvSpPr>
         <p:spPr>
           <a:xfrm>
-            <a:off x="1108561" y="617517"/>
-            <a:ext cx="526106" cy="769441"/>
+            <a:off x="8481223" y="901895"/>
+            <a:ext cx="482824" cy="769441"/>
           </a:xfrm>
           <a:prstGeom prst="rect">
             <a:avLst/>
@@ -4039,17 +4189,53 @@
           <a:p>
             <a:r>
               <a:rPr lang="en-US" sz="4400" b="1" dirty="0"/>
-              <a:t>A</a:t>
-            </a:r>
-          </a:p>
-        </p:txBody>
-      </p:sp>
-      <p:sp>
-        <p:nvSpPr>
-          <p:cNvPr id="7" name="TextBox 6">
-            <a:extLst>
-              <a:ext uri="{FF2B5EF4-FFF2-40B4-BE49-F238E27FC236}">
-                <a16:creationId xmlns:a16="http://schemas.microsoft.com/office/drawing/2014/main" id="{B5D4C74E-7540-43D1-1B53-1C64D8372305}"/>
+              <a:t>C</a:t>
+            </a:r>
+          </a:p>
+        </p:txBody>
+      </p:sp>
+      <p:pic>
+        <p:nvPicPr>
+          <p:cNvPr id="21" name="Picture 20" descr="A close-up of a brain&#10;&#10;Description automatically generated">
+            <a:extLst>
+              <a:ext uri="{FF2B5EF4-FFF2-40B4-BE49-F238E27FC236}">
+                <a16:creationId xmlns:a16="http://schemas.microsoft.com/office/drawing/2014/main" id="{8D3C905F-7A27-B63D-C982-F824408240C2}"/>
+              </a:ext>
+            </a:extLst>
+          </p:cNvPr>
+          <p:cNvPicPr>
+            <a:picLocks noChangeAspect="1"/>
+          </p:cNvPicPr>
+          <p:nvPr/>
+        </p:nvPicPr>
+        <p:blipFill>
+          <a:blip r:embed="rId6">
+            <a:extLst>
+              <a:ext uri="{28A0092B-C50C-407E-A947-70E740481C1C}">
+                <a14:useLocalDpi xmlns:a14="http://schemas.microsoft.com/office/drawing/2010/main" val="0"/>
+              </a:ext>
+            </a:extLst>
+          </a:blip>
+          <a:stretch>
+            <a:fillRect/>
+          </a:stretch>
+        </p:blipFill>
+        <p:spPr>
+          <a:xfrm>
+            <a:off x="8722635" y="1483643"/>
+            <a:ext cx="2699782" cy="2161935"/>
+          </a:xfrm>
+          <a:prstGeom prst="rect">
+            <a:avLst/>
+          </a:prstGeom>
+        </p:spPr>
+      </p:pic>
+      <p:sp>
+        <p:nvSpPr>
+          <p:cNvPr id="22" name="TextBox 21">
+            <a:extLst>
+              <a:ext uri="{FF2B5EF4-FFF2-40B4-BE49-F238E27FC236}">
+                <a16:creationId xmlns:a16="http://schemas.microsoft.com/office/drawing/2014/main" id="{BAC66FFB-ADD0-9BC8-63A3-2E8424295C5F}"/>
               </a:ext>
             </a:extLst>
           </p:cNvPr>
@@ -4058,8 +4244,8 @@
         </p:nvSpPr>
         <p:spPr>
           <a:xfrm>
-            <a:off x="7576458" y="617516"/>
-            <a:ext cx="500458" cy="769441"/>
+            <a:off x="9041022" y="356086"/>
+            <a:ext cx="2063008" cy="954107"/>
           </a:xfrm>
           <a:prstGeom prst="rect">
             <a:avLst/>
@@ -4067,95 +4253,16 @@
           <a:noFill/>
         </p:spPr>
         <p:txBody>
-          <a:bodyPr wrap="none" rtlCol="0">
-            <a:spAutoFit/>
-          </a:bodyPr>
-          <a:lstStyle/>
-          <a:p>
-            <a:r>
-              <a:rPr lang="en-US" sz="4400" b="1" dirty="0"/>
-              <a:t>B</a:t>
-            </a:r>
-          </a:p>
-        </p:txBody>
-      </p:sp>
-      <p:sp>
-        <p:nvSpPr>
-          <p:cNvPr id="11" name="TextBox 10">
-            <a:extLst>
-              <a:ext uri="{FF2B5EF4-FFF2-40B4-BE49-F238E27FC236}">
-                <a16:creationId xmlns:a16="http://schemas.microsoft.com/office/drawing/2014/main" id="{FCB59BAB-2460-C1E6-ABC6-A3EB6B3D1EE2}"/>
-              </a:ext>
-            </a:extLst>
-          </p:cNvPr>
-          <p:cNvSpPr txBox="1"/>
-          <p:nvPr/>
-        </p:nvSpPr>
-        <p:spPr>
-          <a:xfrm>
-            <a:off x="2121700" y="94296"/>
-            <a:ext cx="2811582" cy="523220"/>
-          </a:xfrm>
-          <a:prstGeom prst="rect">
-            <a:avLst/>
-          </a:prstGeom>
-          <a:noFill/>
-        </p:spPr>
-        <p:txBody>
           <a:bodyPr wrap="square" rtlCol="0">
             <a:spAutoFit/>
           </a:bodyPr>
           <a:lstStyle/>
           <a:p>
+            <a:pPr algn="ctr"/>
             <a:r>
               <a:rPr lang="en-US" sz="2800" dirty="0"/>
-              <a:t>Pre-</a:t>
-            </a:r>
-            <a:r>
-              <a:rPr lang="en-US" sz="2800" dirty="0" err="1"/>
-              <a:t>DecNef</a:t>
-            </a:r>
-            <a:endParaRPr lang="en-US" sz="2800" dirty="0"/>
-          </a:p>
-        </p:txBody>
-      </p:sp>
-      <p:sp>
-        <p:nvSpPr>
-          <p:cNvPr id="12" name="TextBox 11">
-            <a:extLst>
-              <a:ext uri="{FF2B5EF4-FFF2-40B4-BE49-F238E27FC236}">
-                <a16:creationId xmlns:a16="http://schemas.microsoft.com/office/drawing/2014/main" id="{A9F670C1-47AE-EEC6-68BE-5D1ACCDA4417}"/>
-              </a:ext>
-            </a:extLst>
-          </p:cNvPr>
-          <p:cNvSpPr txBox="1"/>
-          <p:nvPr/>
-        </p:nvSpPr>
-        <p:spPr>
-          <a:xfrm>
-            <a:off x="8356118" y="94296"/>
-            <a:ext cx="2811582" cy="523220"/>
-          </a:xfrm>
-          <a:prstGeom prst="rect">
-            <a:avLst/>
-          </a:prstGeom>
-          <a:noFill/>
-        </p:spPr>
-        <p:txBody>
-          <a:bodyPr wrap="square" rtlCol="0">
-            <a:spAutoFit/>
-          </a:bodyPr>
-          <a:lstStyle/>
-          <a:p>
-            <a:r>
-              <a:rPr lang="en-US" sz="2800" dirty="0"/>
-              <a:t>Post-</a:t>
-            </a:r>
-            <a:r>
-              <a:rPr lang="en-US" sz="2800" dirty="0" err="1"/>
-              <a:t>DecNef</a:t>
-            </a:r>
-            <a:endParaRPr lang="en-US" sz="2800" dirty="0"/>
+              <a:t>Significant Change</a:t>
+            </a:r>
           </a:p>
         </p:txBody>
       </p:sp>
@@ -4762,13 +4869,18 @@
         </p:nvSpPr>
         <p:spPr>
           <a:xfrm>
-            <a:off x="5510145" y="4302676"/>
-            <a:ext cx="300082" cy="369332"/>
+            <a:off x="4663659" y="2534397"/>
+            <a:ext cx="747320" cy="261610"/>
           </a:xfrm>
           <a:prstGeom prst="rect">
             <a:avLst/>
           </a:prstGeom>
           <a:noFill/>
+          <a:ln>
+            <a:solidFill>
+              <a:schemeClr val="tx1"/>
+            </a:solidFill>
+          </a:ln>
         </p:spPr>
         <p:txBody>
           <a:bodyPr wrap="none" rtlCol="0">
@@ -4777,12 +4889,8 @@
           <a:lstStyle/>
           <a:p>
             <a:r>
-              <a:rPr lang="en-US" dirty="0">
-                <a:solidFill>
-                  <a:srgbClr val="BE2F11"/>
-                </a:solidFill>
-              </a:rPr>
-              <a:t>*</a:t>
+              <a:rPr lang="en-US" sz="1100" dirty="0"/>
+              <a:t>* p = .021</a:t>
             </a:r>
           </a:p>
         </p:txBody>

</xml_diff>